<commit_message>
Docker: Dockerfile and presenation
</commit_message>
<xml_diff>
--- a/intro-docker/presentation/intro-to-docker.pptx
+++ b/intro-docker/presentation/intro-to-docker.pptx
@@ -5,7 +5,7 @@
     <p:sldMasterId id="2147484471" r:id="rId1"/>
   </p:sldMasterIdLst>
   <p:notesMasterIdLst>
-    <p:notesMasterId r:id="rId11"/>
+    <p:notesMasterId r:id="rId14"/>
   </p:notesMasterIdLst>
   <p:sldIdLst>
     <p:sldId id="256" r:id="rId2"/>
@@ -17,6 +17,9 @@
     <p:sldId id="261" r:id="rId8"/>
     <p:sldId id="264" r:id="rId9"/>
     <p:sldId id="263" r:id="rId10"/>
+    <p:sldId id="265" r:id="rId11"/>
+    <p:sldId id="266" r:id="rId12"/>
+    <p:sldId id="267" r:id="rId13"/>
   </p:sldIdLst>
   <p:sldSz cx="12192000" cy="6858000"/>
   <p:notesSz cx="6858000" cy="9144000"/>
@@ -115,6 +118,11 @@
       </a:defRPr>
     </a:lvl9pPr>
   </p:defaultTextStyle>
+  <p:extLst>
+    <p:ext uri="{EFAFB233-063F-42B5-8137-9DF3F51BA10A}">
+      <p15:sldGuideLst xmlns:p15="http://schemas.microsoft.com/office/powerpoint/2012/main"/>
+    </p:ext>
+  </p:extLst>
 </p:presentation>
 </file>
 
@@ -200,7 +208,7 @@
           <a:p>
             <a:fld id="{C1BF1D47-6C0B-1B44-B673-7AB6DD7A68BF}" type="datetimeFigureOut">
               <a:rPr lang="en-US" smtClean="0"/>
-              <a:t>5/18/22</a:t>
+              <a:t>5/21/22</a:t>
             </a:fld>
             <a:endParaRPr lang="en-US"/>
           </a:p>
@@ -1017,7 +1025,7 @@
           <a:p>
             <a:fld id="{545F52BB-21D4-C14E-927F-1A7B620E7579}" type="datetimeFigureOut">
               <a:rPr lang="en-US" smtClean="0"/>
-              <a:t>5/18/22</a:t>
+              <a:t>5/21/22</a:t>
             </a:fld>
             <a:endParaRPr lang="en-US"/>
           </a:p>
@@ -1075,13 +1083,13 @@
   <p:clrMapOvr>
     <a:masterClrMapping/>
   </p:clrMapOvr>
-  <mc:AlternateContent xmlns:mc="http://schemas.openxmlformats.org/markup-compatibility/2006">
-    <mc:Choice xmlns:p14="http://schemas.microsoft.com/office/powerpoint/2010/main" Requires="p14">
+  <mc:AlternateContent xmlns:mc="http://schemas.openxmlformats.org/markup-compatibility/2006" xmlns:p14="http://schemas.microsoft.com/office/powerpoint/2010/main">
+    <mc:Choice Requires="p14">
       <p:transition spd="med" p14:dur="700">
         <p:fade/>
       </p:transition>
     </mc:Choice>
-    <mc:Fallback>
+    <mc:Fallback xmlns="">
       <p:transition spd="med">
         <p:fade/>
       </p:transition>
@@ -1347,7 +1355,7 @@
           <a:p>
             <a:fld id="{545F52BB-21D4-C14E-927F-1A7B620E7579}" type="datetimeFigureOut">
               <a:rPr lang="en-US" smtClean="0"/>
-              <a:t>5/18/22</a:t>
+              <a:t>5/21/22</a:t>
             </a:fld>
             <a:endParaRPr lang="en-US"/>
           </a:p>
@@ -1405,13 +1413,13 @@
   <p:clrMapOvr>
     <a:masterClrMapping/>
   </p:clrMapOvr>
-  <mc:AlternateContent xmlns:mc="http://schemas.openxmlformats.org/markup-compatibility/2006">
-    <mc:Choice xmlns:p14="http://schemas.microsoft.com/office/powerpoint/2010/main" Requires="p14">
+  <mc:AlternateContent xmlns:mc="http://schemas.openxmlformats.org/markup-compatibility/2006" xmlns:p14="http://schemas.microsoft.com/office/powerpoint/2010/main">
+    <mc:Choice Requires="p14">
       <p:transition spd="med" p14:dur="700">
         <p:fade/>
       </p:transition>
     </mc:Choice>
-    <mc:Fallback>
+    <mc:Fallback xmlns="">
       <p:transition spd="med">
         <p:fade/>
       </p:transition>
@@ -1847,7 +1855,7 @@
           <a:p>
             <a:fld id="{545F52BB-21D4-C14E-927F-1A7B620E7579}" type="datetimeFigureOut">
               <a:rPr lang="en-US" smtClean="0"/>
-              <a:t>5/18/22</a:t>
+              <a:t>5/21/22</a:t>
             </a:fld>
             <a:endParaRPr lang="en-US"/>
           </a:p>
@@ -1905,13 +1913,13 @@
   <p:clrMapOvr>
     <a:masterClrMapping/>
   </p:clrMapOvr>
-  <mc:AlternateContent xmlns:mc="http://schemas.openxmlformats.org/markup-compatibility/2006">
-    <mc:Choice xmlns:p14="http://schemas.microsoft.com/office/powerpoint/2010/main" Requires="p14">
+  <mc:AlternateContent xmlns:mc="http://schemas.openxmlformats.org/markup-compatibility/2006" xmlns:p14="http://schemas.microsoft.com/office/powerpoint/2010/main">
+    <mc:Choice Requires="p14">
       <p:transition spd="med" p14:dur="700">
         <p:fade/>
       </p:transition>
     </mc:Choice>
-    <mc:Fallback>
+    <mc:Fallback xmlns="">
       <p:transition spd="med">
         <p:fade/>
       </p:transition>
@@ -2228,7 +2236,7 @@
           <a:p>
             <a:fld id="{545F52BB-21D4-C14E-927F-1A7B620E7579}" type="datetimeFigureOut">
               <a:rPr lang="en-US" smtClean="0"/>
-              <a:t>5/18/22</a:t>
+              <a:t>5/21/22</a:t>
             </a:fld>
             <a:endParaRPr lang="en-US"/>
           </a:p>
@@ -2286,13 +2294,13 @@
   <p:clrMapOvr>
     <a:masterClrMapping/>
   </p:clrMapOvr>
-  <mc:AlternateContent xmlns:mc="http://schemas.openxmlformats.org/markup-compatibility/2006">
-    <mc:Choice xmlns:p14="http://schemas.microsoft.com/office/powerpoint/2010/main" Requires="p14">
+  <mc:AlternateContent xmlns:mc="http://schemas.openxmlformats.org/markup-compatibility/2006" xmlns:p14="http://schemas.microsoft.com/office/powerpoint/2010/main">
+    <mc:Choice Requires="p14">
       <p:transition spd="med" p14:dur="700">
         <p:fade/>
       </p:transition>
     </mc:Choice>
-    <mc:Fallback>
+    <mc:Fallback xmlns="">
       <p:transition spd="med">
         <p:fade/>
       </p:transition>
@@ -2513,7 +2521,7 @@
           <a:p>
             <a:fld id="{545F52BB-21D4-C14E-927F-1A7B620E7579}" type="datetimeFigureOut">
               <a:rPr lang="en-US" smtClean="0"/>
-              <a:t>5/18/22</a:t>
+              <a:t>5/21/22</a:t>
             </a:fld>
             <a:endParaRPr lang="en-US"/>
           </a:p>
@@ -2571,13 +2579,13 @@
   <p:clrMapOvr>
     <a:masterClrMapping/>
   </p:clrMapOvr>
-  <mc:AlternateContent xmlns:mc="http://schemas.openxmlformats.org/markup-compatibility/2006">
-    <mc:Choice xmlns:p14="http://schemas.microsoft.com/office/powerpoint/2010/main" Requires="p14">
+  <mc:AlternateContent xmlns:mc="http://schemas.openxmlformats.org/markup-compatibility/2006" xmlns:p14="http://schemas.microsoft.com/office/powerpoint/2010/main">
+    <mc:Choice Requires="p14">
       <p:transition spd="med" p14:dur="700">
         <p:fade/>
       </p:transition>
     </mc:Choice>
-    <mc:Fallback>
+    <mc:Fallback xmlns="">
       <p:transition spd="med">
         <p:fade/>
       </p:transition>
@@ -2810,7 +2818,7 @@
           <a:p>
             <a:fld id="{545F52BB-21D4-C14E-927F-1A7B620E7579}" type="datetimeFigureOut">
               <a:rPr lang="en-US" smtClean="0"/>
-              <a:t>5/18/22</a:t>
+              <a:t>5/21/22</a:t>
             </a:fld>
             <a:endParaRPr lang="en-US"/>
           </a:p>
@@ -2868,13 +2876,13 @@
   <p:clrMapOvr>
     <a:masterClrMapping/>
   </p:clrMapOvr>
-  <mc:AlternateContent xmlns:mc="http://schemas.openxmlformats.org/markup-compatibility/2006">
-    <mc:Choice xmlns:p14="http://schemas.microsoft.com/office/powerpoint/2010/main" Requires="p14">
+  <mc:AlternateContent xmlns:mc="http://schemas.openxmlformats.org/markup-compatibility/2006" xmlns:p14="http://schemas.microsoft.com/office/powerpoint/2010/main">
+    <mc:Choice Requires="p14">
       <p:transition spd="med" p14:dur="700">
         <p:fade/>
       </p:transition>
     </mc:Choice>
-    <mc:Fallback>
+    <mc:Fallback xmlns="">
       <p:transition spd="med">
         <p:fade/>
       </p:transition>
@@ -3105,7 +3113,7 @@
           <a:p>
             <a:fld id="{545F52BB-21D4-C14E-927F-1A7B620E7579}" type="datetimeFigureOut">
               <a:rPr lang="en-US" smtClean="0"/>
-              <a:t>5/18/22</a:t>
+              <a:t>5/21/22</a:t>
             </a:fld>
             <a:endParaRPr lang="en-US"/>
           </a:p>
@@ -3163,13 +3171,13 @@
   <p:clrMapOvr>
     <a:masterClrMapping/>
   </p:clrMapOvr>
-  <mc:AlternateContent xmlns:mc="http://schemas.openxmlformats.org/markup-compatibility/2006">
-    <mc:Choice xmlns:p14="http://schemas.microsoft.com/office/powerpoint/2010/main" Requires="p14">
+  <mc:AlternateContent xmlns:mc="http://schemas.openxmlformats.org/markup-compatibility/2006" xmlns:p14="http://schemas.microsoft.com/office/powerpoint/2010/main">
+    <mc:Choice Requires="p14">
       <p:transition spd="med" p14:dur="700">
         <p:fade/>
       </p:transition>
     </mc:Choice>
-    <mc:Fallback>
+    <mc:Fallback xmlns="">
       <p:transition spd="med">
         <p:fade/>
       </p:transition>
@@ -3460,7 +3468,7 @@
           <a:p>
             <a:fld id="{545F52BB-21D4-C14E-927F-1A7B620E7579}" type="datetimeFigureOut">
               <a:rPr lang="en-US" smtClean="0"/>
-              <a:t>5/18/22</a:t>
+              <a:t>5/21/22</a:t>
             </a:fld>
             <a:endParaRPr lang="en-US"/>
           </a:p>
@@ -3518,13 +3526,13 @@
   <p:clrMapOvr>
     <a:masterClrMapping/>
   </p:clrMapOvr>
-  <mc:AlternateContent xmlns:mc="http://schemas.openxmlformats.org/markup-compatibility/2006">
-    <mc:Choice xmlns:p14="http://schemas.microsoft.com/office/powerpoint/2010/main" Requires="p14">
+  <mc:AlternateContent xmlns:mc="http://schemas.openxmlformats.org/markup-compatibility/2006" xmlns:p14="http://schemas.microsoft.com/office/powerpoint/2010/main">
+    <mc:Choice Requires="p14">
       <p:transition spd="med" p14:dur="700">
         <p:fade/>
       </p:transition>
     </mc:Choice>
-    <mc:Fallback>
+    <mc:Fallback xmlns="">
       <p:transition spd="med">
         <p:fade/>
       </p:transition>
@@ -3811,7 +3819,7 @@
           <a:p>
             <a:fld id="{545F52BB-21D4-C14E-927F-1A7B620E7579}" type="datetimeFigureOut">
               <a:rPr lang="en-US" smtClean="0"/>
-              <a:t>5/18/22</a:t>
+              <a:t>5/21/22</a:t>
             </a:fld>
             <a:endParaRPr lang="en-US"/>
           </a:p>
@@ -3869,13 +3877,13 @@
   <p:clrMapOvr>
     <a:masterClrMapping/>
   </p:clrMapOvr>
-  <mc:AlternateContent xmlns:mc="http://schemas.openxmlformats.org/markup-compatibility/2006">
-    <mc:Choice xmlns:p14="http://schemas.microsoft.com/office/powerpoint/2010/main" Requires="p14">
+  <mc:AlternateContent xmlns:mc="http://schemas.openxmlformats.org/markup-compatibility/2006" xmlns:p14="http://schemas.microsoft.com/office/powerpoint/2010/main">
+    <mc:Choice Requires="p14">
       <p:transition spd="med" p14:dur="700">
         <p:fade/>
       </p:transition>
     </mc:Choice>
-    <mc:Fallback>
+    <mc:Fallback xmlns="">
       <p:transition spd="med">
         <p:fade/>
       </p:transition>
@@ -4305,7 +4313,7 @@
           <a:p>
             <a:fld id="{545F52BB-21D4-C14E-927F-1A7B620E7579}" type="datetimeFigureOut">
               <a:rPr lang="en-US" smtClean="0"/>
-              <a:t>5/18/22</a:t>
+              <a:t>5/21/22</a:t>
             </a:fld>
             <a:endParaRPr lang="en-US"/>
           </a:p>
@@ -4363,13 +4371,13 @@
   <p:clrMapOvr>
     <a:masterClrMapping/>
   </p:clrMapOvr>
-  <mc:AlternateContent xmlns:mc="http://schemas.openxmlformats.org/markup-compatibility/2006">
-    <mc:Choice xmlns:p14="http://schemas.microsoft.com/office/powerpoint/2010/main" Requires="p14">
+  <mc:AlternateContent xmlns:mc="http://schemas.openxmlformats.org/markup-compatibility/2006" xmlns:p14="http://schemas.microsoft.com/office/powerpoint/2010/main">
+    <mc:Choice Requires="p14">
       <p:transition spd="med" p14:dur="700">
         <p:fade/>
       </p:transition>
     </mc:Choice>
-    <mc:Fallback>
+    <mc:Fallback xmlns="">
       <p:transition spd="med">
         <p:fade/>
       </p:transition>
@@ -4538,7 +4546,7 @@
           <a:p>
             <a:fld id="{545F52BB-21D4-C14E-927F-1A7B620E7579}" type="datetimeFigureOut">
               <a:rPr lang="en-US" smtClean="0"/>
-              <a:t>5/18/22</a:t>
+              <a:t>5/21/22</a:t>
             </a:fld>
             <a:endParaRPr lang="en-US"/>
           </a:p>
@@ -4596,13 +4604,13 @@
   <p:clrMapOvr>
     <a:masterClrMapping/>
   </p:clrMapOvr>
-  <mc:AlternateContent xmlns:mc="http://schemas.openxmlformats.org/markup-compatibility/2006">
-    <mc:Choice xmlns:p14="http://schemas.microsoft.com/office/powerpoint/2010/main" Requires="p14">
+  <mc:AlternateContent xmlns:mc="http://schemas.openxmlformats.org/markup-compatibility/2006" xmlns:p14="http://schemas.microsoft.com/office/powerpoint/2010/main">
+    <mc:Choice Requires="p14">
       <p:transition spd="med" p14:dur="700">
         <p:fade/>
       </p:transition>
     </mc:Choice>
-    <mc:Fallback>
+    <mc:Fallback xmlns="">
       <p:transition spd="med">
         <p:fade/>
       </p:transition>
@@ -4645,7 +4653,7 @@
           <a:p>
             <a:fld id="{545F52BB-21D4-C14E-927F-1A7B620E7579}" type="datetimeFigureOut">
               <a:rPr lang="en-US" smtClean="0"/>
-              <a:t>5/18/22</a:t>
+              <a:t>5/21/22</a:t>
             </a:fld>
             <a:endParaRPr lang="en-US"/>
           </a:p>
@@ -4703,13 +4711,13 @@
   <p:clrMapOvr>
     <a:masterClrMapping/>
   </p:clrMapOvr>
-  <mc:AlternateContent xmlns:mc="http://schemas.openxmlformats.org/markup-compatibility/2006">
-    <mc:Choice xmlns:p14="http://schemas.microsoft.com/office/powerpoint/2010/main" Requires="p14">
+  <mc:AlternateContent xmlns:mc="http://schemas.openxmlformats.org/markup-compatibility/2006" xmlns:p14="http://schemas.microsoft.com/office/powerpoint/2010/main">
+    <mc:Choice Requires="p14">
       <p:transition spd="med" p14:dur="700">
         <p:fade/>
       </p:transition>
     </mc:Choice>
-    <mc:Fallback>
+    <mc:Fallback xmlns="">
       <p:transition spd="med">
         <p:fade/>
       </p:transition>
@@ -5124,7 +5132,7 @@
           <a:p>
             <a:fld id="{545F52BB-21D4-C14E-927F-1A7B620E7579}" type="datetimeFigureOut">
               <a:rPr lang="en-US" smtClean="0"/>
-              <a:t>5/18/22</a:t>
+              <a:t>5/21/22</a:t>
             </a:fld>
             <a:endParaRPr lang="en-US"/>
           </a:p>
@@ -5182,13 +5190,13 @@
   <p:clrMapOvr>
     <a:masterClrMapping/>
   </p:clrMapOvr>
-  <mc:AlternateContent xmlns:mc="http://schemas.openxmlformats.org/markup-compatibility/2006">
-    <mc:Choice xmlns:p14="http://schemas.microsoft.com/office/powerpoint/2010/main" Requires="p14">
+  <mc:AlternateContent xmlns:mc="http://schemas.openxmlformats.org/markup-compatibility/2006" xmlns:p14="http://schemas.microsoft.com/office/powerpoint/2010/main">
+    <mc:Choice Requires="p14">
       <p:transition spd="med" p14:dur="700">
         <p:fade/>
       </p:transition>
     </mc:Choice>
-    <mc:Fallback>
+    <mc:Fallback xmlns="">
       <p:transition spd="med">
         <p:fade/>
       </p:transition>
@@ -5454,7 +5462,7 @@
           <a:p>
             <a:fld id="{545F52BB-21D4-C14E-927F-1A7B620E7579}" type="datetimeFigureOut">
               <a:rPr lang="en-US" smtClean="0"/>
-              <a:t>5/18/22</a:t>
+              <a:t>5/21/22</a:t>
             </a:fld>
             <a:endParaRPr lang="en-US"/>
           </a:p>
@@ -5522,13 +5530,13 @@
   <p:clrMapOvr>
     <a:masterClrMapping/>
   </p:clrMapOvr>
-  <mc:AlternateContent xmlns:mc="http://schemas.openxmlformats.org/markup-compatibility/2006">
-    <mc:Choice xmlns:p14="http://schemas.microsoft.com/office/powerpoint/2010/main" Requires="p14">
+  <mc:AlternateContent xmlns:mc="http://schemas.openxmlformats.org/markup-compatibility/2006" xmlns:p14="http://schemas.microsoft.com/office/powerpoint/2010/main">
+    <mc:Choice Requires="p14">
       <p:transition spd="med" p14:dur="700">
         <p:fade/>
       </p:transition>
     </mc:Choice>
-    <mc:Fallback>
+    <mc:Fallback xmlns="">
       <p:transition spd="med">
         <p:fade/>
       </p:transition>
@@ -5736,7 +5744,7 @@
           <a:p>
             <a:fld id="{545F52BB-21D4-C14E-927F-1A7B620E7579}" type="datetimeFigureOut">
               <a:rPr lang="en-US" smtClean="0"/>
-              <a:t>5/18/22</a:t>
+              <a:t>5/21/22</a:t>
             </a:fld>
             <a:endParaRPr lang="en-US"/>
           </a:p>
@@ -5805,13 +5813,13 @@
     <p:sldLayoutId id="2147484484" r:id="rId13"/>
     <p:sldLayoutId id="2147484485" r:id="rId14"/>
   </p:sldLayoutIdLst>
-  <mc:AlternateContent xmlns:mc="http://schemas.openxmlformats.org/markup-compatibility/2006">
-    <mc:Choice xmlns:p14="http://schemas.microsoft.com/office/powerpoint/2010/main" Requires="p14">
+  <mc:AlternateContent xmlns:mc="http://schemas.openxmlformats.org/markup-compatibility/2006" xmlns:p14="http://schemas.microsoft.com/office/powerpoint/2010/main">
+    <mc:Choice Requires="p14">
       <p:transition spd="med" p14:dur="700">
         <p:fade/>
       </p:transition>
     </mc:Choice>
-    <mc:Fallback>
+    <mc:Fallback xmlns="">
       <p:transition spd="med">
         <p:fade/>
       </p:transition>
@@ -6273,13 +6281,313 @@
   <p:clrMapOvr>
     <a:masterClrMapping/>
   </p:clrMapOvr>
-  <mc:AlternateContent xmlns:mc="http://schemas.openxmlformats.org/markup-compatibility/2006">
-    <mc:Choice xmlns:p14="http://schemas.microsoft.com/office/powerpoint/2010/main" Requires="p14">
+  <mc:AlternateContent xmlns:mc="http://schemas.openxmlformats.org/markup-compatibility/2006" xmlns:p14="http://schemas.microsoft.com/office/powerpoint/2010/main">
+    <mc:Choice Requires="p14">
       <p:transition spd="med" p14:dur="700">
         <p:fade/>
       </p:transition>
     </mc:Choice>
-    <mc:Fallback>
+    <mc:Fallback xmlns="">
+      <p:transition spd="med">
+        <p:fade/>
+      </p:transition>
+    </mc:Fallback>
+  </mc:AlternateContent>
+</p:sld>
+</file>
+
+<file path=ppt/slides/slide10.xml><?xml version="1.0" encoding="utf-8"?>
+<p:sld xmlns:a="http://schemas.openxmlformats.org/drawingml/2006/main" xmlns:r="http://schemas.openxmlformats.org/officeDocument/2006/relationships" xmlns:p="http://schemas.openxmlformats.org/presentationml/2006/main">
+  <p:cSld>
+    <p:spTree>
+      <p:nvGrpSpPr>
+        <p:cNvPr id="1" name=""/>
+        <p:cNvGrpSpPr/>
+        <p:nvPr/>
+      </p:nvGrpSpPr>
+      <p:grpSpPr>
+        <a:xfrm>
+          <a:off x="0" y="0"/>
+          <a:ext cx="0" cy="0"/>
+          <a:chOff x="0" y="0"/>
+          <a:chExt cx="0" cy="0"/>
+        </a:xfrm>
+      </p:grpSpPr>
+      <p:sp>
+        <p:nvSpPr>
+          <p:cNvPr id="2" name="Title 1">
+            <a:extLst>
+              <a:ext uri="{FF2B5EF4-FFF2-40B4-BE49-F238E27FC236}">
+                <a16:creationId xmlns:a16="http://schemas.microsoft.com/office/drawing/2014/main" id="{8E6263C1-CA40-5BC9-92AA-7D371D38B9AF}"/>
+              </a:ext>
+            </a:extLst>
+          </p:cNvPr>
+          <p:cNvSpPr>
+            <a:spLocks noGrp="1"/>
+          </p:cNvSpPr>
+          <p:nvPr>
+            <p:ph type="title"/>
+          </p:nvPr>
+        </p:nvSpPr>
+        <p:spPr/>
+        <p:txBody>
+          <a:bodyPr/>
+          <a:lstStyle/>
+          <a:p>
+            <a:r>
+              <a:rPr lang="en-US" dirty="0"/>
+              <a:t>A Few Takeaways</a:t>
+            </a:r>
+          </a:p>
+        </p:txBody>
+      </p:sp>
+      <p:sp>
+        <p:nvSpPr>
+          <p:cNvPr id="3" name="Text Placeholder 2">
+            <a:extLst>
+              <a:ext uri="{FF2B5EF4-FFF2-40B4-BE49-F238E27FC236}">
+                <a16:creationId xmlns:a16="http://schemas.microsoft.com/office/drawing/2014/main" id="{DBD593F8-5240-91FB-2F56-6D03F20498F4}"/>
+              </a:ext>
+            </a:extLst>
+          </p:cNvPr>
+          <p:cNvSpPr>
+            <a:spLocks noGrp="1"/>
+          </p:cNvSpPr>
+          <p:nvPr>
+            <p:ph type="body" idx="1"/>
+          </p:nvPr>
+        </p:nvSpPr>
+        <p:spPr/>
+        <p:txBody>
+          <a:bodyPr/>
+          <a:lstStyle/>
+          <a:p>
+            <a:endParaRPr lang="en-US"/>
+          </a:p>
+        </p:txBody>
+      </p:sp>
+    </p:spTree>
+    <p:extLst>
+      <p:ext uri="{BB962C8B-B14F-4D97-AF65-F5344CB8AC3E}">
+        <p14:creationId xmlns:p14="http://schemas.microsoft.com/office/powerpoint/2010/main" val="2858677990"/>
+      </p:ext>
+    </p:extLst>
+  </p:cSld>
+  <p:clrMapOvr>
+    <a:masterClrMapping/>
+  </p:clrMapOvr>
+  <mc:AlternateContent xmlns:mc="http://schemas.openxmlformats.org/markup-compatibility/2006" xmlns:p14="http://schemas.microsoft.com/office/powerpoint/2010/main">
+    <mc:Choice Requires="p14">
+      <p:transition spd="med" p14:dur="700">
+        <p:fade/>
+      </p:transition>
+    </mc:Choice>
+    <mc:Fallback xmlns="">
+      <p:transition spd="med">
+        <p:fade/>
+      </p:transition>
+    </mc:Fallback>
+  </mc:AlternateContent>
+</p:sld>
+</file>
+
+<file path=ppt/slides/slide11.xml><?xml version="1.0" encoding="utf-8"?>
+<p:sld xmlns:a="http://schemas.openxmlformats.org/drawingml/2006/main" xmlns:r="http://schemas.openxmlformats.org/officeDocument/2006/relationships" xmlns:p="http://schemas.openxmlformats.org/presentationml/2006/main">
+  <p:cSld>
+    <p:spTree>
+      <p:nvGrpSpPr>
+        <p:cNvPr id="1" name=""/>
+        <p:cNvGrpSpPr/>
+        <p:nvPr/>
+      </p:nvGrpSpPr>
+      <p:grpSpPr>
+        <a:xfrm>
+          <a:off x="0" y="0"/>
+          <a:ext cx="0" cy="0"/>
+          <a:chOff x="0" y="0"/>
+          <a:chExt cx="0" cy="0"/>
+        </a:xfrm>
+      </p:grpSpPr>
+      <p:sp>
+        <p:nvSpPr>
+          <p:cNvPr id="2" name="Title 1">
+            <a:extLst>
+              <a:ext uri="{FF2B5EF4-FFF2-40B4-BE49-F238E27FC236}">
+                <a16:creationId xmlns:a16="http://schemas.microsoft.com/office/drawing/2014/main" id="{DD13BAF0-C6D0-6C35-7E1E-54E8C803D102}"/>
+              </a:ext>
+            </a:extLst>
+          </p:cNvPr>
+          <p:cNvSpPr>
+            <a:spLocks noGrp="1"/>
+          </p:cNvSpPr>
+          <p:nvPr>
+            <p:ph type="title"/>
+          </p:nvPr>
+        </p:nvSpPr>
+        <p:spPr/>
+        <p:txBody>
+          <a:bodyPr/>
+          <a:lstStyle/>
+          <a:p>
+            <a:r>
+              <a:rPr lang="en-US" dirty="0"/>
+              <a:t>A Few Takeaways</a:t>
+            </a:r>
+          </a:p>
+        </p:txBody>
+      </p:sp>
+      <p:sp>
+        <p:nvSpPr>
+          <p:cNvPr id="3" name="Content Placeholder 2">
+            <a:extLst>
+              <a:ext uri="{FF2B5EF4-FFF2-40B4-BE49-F238E27FC236}">
+                <a16:creationId xmlns:a16="http://schemas.microsoft.com/office/drawing/2014/main" id="{F948990A-5766-F5D5-B6C4-E83EC504FDAF}"/>
+              </a:ext>
+            </a:extLst>
+          </p:cNvPr>
+          <p:cNvSpPr>
+            <a:spLocks noGrp="1"/>
+          </p:cNvSpPr>
+          <p:nvPr>
+            <p:ph idx="1"/>
+          </p:nvPr>
+        </p:nvSpPr>
+        <p:spPr/>
+        <p:txBody>
+          <a:bodyPr/>
+          <a:lstStyle/>
+          <a:p>
+            <a:r>
+              <a:rPr lang="en-US" dirty="0"/>
+              <a:t>Practice will help you remember, but…</a:t>
+            </a:r>
+          </a:p>
+          <a:p>
+            <a:r>
+              <a:rPr lang="en-US" dirty="0"/>
+              <a:t>It’s okay if you don’t remember everything!</a:t>
+            </a:r>
+          </a:p>
+          <a:p>
+            <a:r>
+              <a:rPr lang="en-US" dirty="0"/>
+              <a:t>Strive to learn new things and be patient</a:t>
+            </a:r>
+          </a:p>
+        </p:txBody>
+      </p:sp>
+    </p:spTree>
+    <p:extLst>
+      <p:ext uri="{BB962C8B-B14F-4D97-AF65-F5344CB8AC3E}">
+        <p14:creationId xmlns:p14="http://schemas.microsoft.com/office/powerpoint/2010/main" val="1870428455"/>
+      </p:ext>
+    </p:extLst>
+  </p:cSld>
+  <p:clrMapOvr>
+    <a:masterClrMapping/>
+  </p:clrMapOvr>
+  <mc:AlternateContent xmlns:mc="http://schemas.openxmlformats.org/markup-compatibility/2006" xmlns:p14="http://schemas.microsoft.com/office/powerpoint/2010/main">
+    <mc:Choice Requires="p14">
+      <p:transition spd="med" p14:dur="700">
+        <p:fade/>
+      </p:transition>
+    </mc:Choice>
+    <mc:Fallback xmlns="">
+      <p:transition spd="med">
+        <p:fade/>
+      </p:transition>
+    </mc:Fallback>
+  </mc:AlternateContent>
+</p:sld>
+</file>
+
+<file path=ppt/slides/slide12.xml><?xml version="1.0" encoding="utf-8"?>
+<p:sld xmlns:a="http://schemas.openxmlformats.org/drawingml/2006/main" xmlns:r="http://schemas.openxmlformats.org/officeDocument/2006/relationships" xmlns:p="http://schemas.openxmlformats.org/presentationml/2006/main">
+  <p:cSld>
+    <p:spTree>
+      <p:nvGrpSpPr>
+        <p:cNvPr id="1" name=""/>
+        <p:cNvGrpSpPr/>
+        <p:nvPr/>
+      </p:nvGrpSpPr>
+      <p:grpSpPr>
+        <a:xfrm>
+          <a:off x="0" y="0"/>
+          <a:ext cx="0" cy="0"/>
+          <a:chOff x="0" y="0"/>
+          <a:chExt cx="0" cy="0"/>
+        </a:xfrm>
+      </p:grpSpPr>
+      <p:sp>
+        <p:nvSpPr>
+          <p:cNvPr id="2" name="Title 1">
+            <a:extLst>
+              <a:ext uri="{FF2B5EF4-FFF2-40B4-BE49-F238E27FC236}">
+                <a16:creationId xmlns:a16="http://schemas.microsoft.com/office/drawing/2014/main" id="{DFAE9FAE-F47D-0E93-67EB-E210274D0472}"/>
+              </a:ext>
+            </a:extLst>
+          </p:cNvPr>
+          <p:cNvSpPr>
+            <a:spLocks noGrp="1"/>
+          </p:cNvSpPr>
+          <p:nvPr>
+            <p:ph type="title"/>
+          </p:nvPr>
+        </p:nvSpPr>
+        <p:spPr/>
+        <p:txBody>
+          <a:bodyPr/>
+          <a:lstStyle/>
+          <a:p>
+            <a:r>
+              <a:rPr lang="en-US" dirty="0"/>
+              <a:t>Thank you for attending!</a:t>
+            </a:r>
+          </a:p>
+        </p:txBody>
+      </p:sp>
+      <p:sp>
+        <p:nvSpPr>
+          <p:cNvPr id="3" name="Text Placeholder 2">
+            <a:extLst>
+              <a:ext uri="{FF2B5EF4-FFF2-40B4-BE49-F238E27FC236}">
+                <a16:creationId xmlns:a16="http://schemas.microsoft.com/office/drawing/2014/main" id="{8B91F699-C506-8E7A-4B6D-B0CC5DD14AE1}"/>
+              </a:ext>
+            </a:extLst>
+          </p:cNvPr>
+          <p:cNvSpPr>
+            <a:spLocks noGrp="1"/>
+          </p:cNvSpPr>
+          <p:nvPr>
+            <p:ph type="body" idx="1"/>
+          </p:nvPr>
+        </p:nvSpPr>
+        <p:spPr/>
+        <p:txBody>
+          <a:bodyPr/>
+          <a:lstStyle/>
+          <a:p>
+            <a:endParaRPr lang="en-US"/>
+          </a:p>
+        </p:txBody>
+      </p:sp>
+    </p:spTree>
+    <p:extLst>
+      <p:ext uri="{BB962C8B-B14F-4D97-AF65-F5344CB8AC3E}">
+        <p14:creationId xmlns:p14="http://schemas.microsoft.com/office/powerpoint/2010/main" val="2773150868"/>
+      </p:ext>
+    </p:extLst>
+  </p:cSld>
+  <p:clrMapOvr>
+    <a:masterClrMapping/>
+  </p:clrMapOvr>
+  <mc:AlternateContent xmlns:mc="http://schemas.openxmlformats.org/markup-compatibility/2006" xmlns:p14="http://schemas.microsoft.com/office/powerpoint/2010/main">
+    <mc:Choice Requires="p14">
+      <p:transition spd="med" p14:dur="700">
+        <p:fade/>
+      </p:transition>
+    </mc:Choice>
+    <mc:Fallback xmlns="">
       <p:transition spd="med">
         <p:fade/>
       </p:transition>
@@ -6368,13 +6676,13 @@
   <p:clrMapOvr>
     <a:masterClrMapping/>
   </p:clrMapOvr>
-  <mc:AlternateContent xmlns:mc="http://schemas.openxmlformats.org/markup-compatibility/2006">
-    <mc:Choice xmlns:p14="http://schemas.microsoft.com/office/powerpoint/2010/main" Requires="p14">
+  <mc:AlternateContent xmlns:mc="http://schemas.openxmlformats.org/markup-compatibility/2006" xmlns:p14="http://schemas.microsoft.com/office/powerpoint/2010/main">
+    <mc:Choice Requires="p14">
       <p:transition spd="med" p14:dur="700">
         <p:fade/>
       </p:transition>
     </mc:Choice>
-    <mc:Fallback>
+    <mc:Fallback xmlns="">
       <p:transition spd="med">
         <p:fade/>
       </p:transition>
@@ -8120,13 +8428,13 @@
   <p:clrMapOvr>
     <a:masterClrMapping/>
   </p:clrMapOvr>
-  <mc:AlternateContent xmlns:mc="http://schemas.openxmlformats.org/markup-compatibility/2006">
-    <mc:Choice xmlns:p14="http://schemas.microsoft.com/office/powerpoint/2010/main" Requires="p14">
+  <mc:AlternateContent xmlns:mc="http://schemas.openxmlformats.org/markup-compatibility/2006" xmlns:p14="http://schemas.microsoft.com/office/powerpoint/2010/main">
+    <mc:Choice Requires="p14">
       <p:transition spd="med" p14:dur="700">
         <p:fade/>
       </p:transition>
     </mc:Choice>
-    <mc:Fallback>
+    <mc:Fallback xmlns="">
       <p:transition spd="med">
         <p:fade/>
       </p:transition>
@@ -11135,13 +11443,13 @@
   <p:clrMapOvr>
     <a:masterClrMapping/>
   </p:clrMapOvr>
-  <mc:AlternateContent xmlns:mc="http://schemas.openxmlformats.org/markup-compatibility/2006">
-    <mc:Choice xmlns:p14="http://schemas.microsoft.com/office/powerpoint/2010/main" Requires="p14">
+  <mc:AlternateContent xmlns:mc="http://schemas.openxmlformats.org/markup-compatibility/2006" xmlns:p14="http://schemas.microsoft.com/office/powerpoint/2010/main">
+    <mc:Choice Requires="p14">
       <p:transition spd="med" p14:dur="700">
         <p:fade/>
       </p:transition>
     </mc:Choice>
-    <mc:Fallback>
+    <mc:Fallback xmlns="">
       <p:transition spd="med">
         <p:fade/>
       </p:transition>
@@ -11313,13 +11621,13 @@
   <p:clrMapOvr>
     <a:masterClrMapping/>
   </p:clrMapOvr>
-  <mc:AlternateContent xmlns:mc="http://schemas.openxmlformats.org/markup-compatibility/2006">
-    <mc:Choice xmlns:p14="http://schemas.microsoft.com/office/powerpoint/2010/main" Requires="p14">
+  <mc:AlternateContent xmlns:mc="http://schemas.openxmlformats.org/markup-compatibility/2006" xmlns:p14="http://schemas.microsoft.com/office/powerpoint/2010/main">
+    <mc:Choice Requires="p14">
       <p:transition spd="med" p14:dur="700">
         <p:fade/>
       </p:transition>
     </mc:Choice>
-    <mc:Fallback>
+    <mc:Fallback xmlns="">
       <p:transition spd="med">
         <p:fade/>
       </p:transition>
@@ -11423,13 +11731,13 @@
   <p:clrMapOvr>
     <a:masterClrMapping/>
   </p:clrMapOvr>
-  <mc:AlternateContent xmlns:mc="http://schemas.openxmlformats.org/markup-compatibility/2006">
-    <mc:Choice xmlns:p14="http://schemas.microsoft.com/office/powerpoint/2010/main" Requires="p14">
+  <mc:AlternateContent xmlns:mc="http://schemas.openxmlformats.org/markup-compatibility/2006" xmlns:p14="http://schemas.microsoft.com/office/powerpoint/2010/main">
+    <mc:Choice Requires="p14">
       <p:transition spd="med" p14:dur="700">
         <p:fade/>
       </p:transition>
     </mc:Choice>
-    <mc:Fallback>
+    <mc:Fallback xmlns="">
       <p:transition spd="med">
         <p:fade/>
       </p:transition>
@@ -12238,13 +12546,13 @@
   <p:clrMapOvr>
     <a:masterClrMapping/>
   </p:clrMapOvr>
-  <mc:AlternateContent xmlns:mc="http://schemas.openxmlformats.org/markup-compatibility/2006">
-    <mc:Choice xmlns:p14="http://schemas.microsoft.com/office/powerpoint/2010/main" Requires="p14">
+  <mc:AlternateContent xmlns:mc="http://schemas.openxmlformats.org/markup-compatibility/2006" xmlns:p14="http://schemas.microsoft.com/office/powerpoint/2010/main">
+    <mc:Choice Requires="p14">
       <p:transition spd="med" p14:dur="700">
         <p:fade/>
       </p:transition>
     </mc:Choice>
-    <mc:Fallback>
+    <mc:Fallback xmlns="">
       <p:transition spd="med">
         <p:fade/>
       </p:transition>
@@ -12356,13 +12664,13 @@
   <p:clrMapOvr>
     <a:masterClrMapping/>
   </p:clrMapOvr>
-  <mc:AlternateContent xmlns:mc="http://schemas.openxmlformats.org/markup-compatibility/2006">
-    <mc:Choice xmlns:p14="http://schemas.microsoft.com/office/powerpoint/2010/main" Requires="p14">
+  <mc:AlternateContent xmlns:mc="http://schemas.openxmlformats.org/markup-compatibility/2006" xmlns:p14="http://schemas.microsoft.com/office/powerpoint/2010/main">
+    <mc:Choice Requires="p14">
       <p:transition spd="med" p14:dur="700">
         <p:fade/>
       </p:transition>
     </mc:Choice>
-    <mc:Fallback>
+    <mc:Fallback xmlns="">
       <p:transition spd="med">
         <p:fade/>
       </p:transition>
@@ -12451,13 +12759,13 @@
   <p:clrMapOvr>
     <a:masterClrMapping/>
   </p:clrMapOvr>
-  <mc:AlternateContent xmlns:mc="http://schemas.openxmlformats.org/markup-compatibility/2006">
-    <mc:Choice xmlns:p14="http://schemas.microsoft.com/office/powerpoint/2010/main" Requires="p14">
+  <mc:AlternateContent xmlns:mc="http://schemas.openxmlformats.org/markup-compatibility/2006" xmlns:p14="http://schemas.microsoft.com/office/powerpoint/2010/main">
+    <mc:Choice Requires="p14">
       <p:transition spd="med" p14:dur="700">
         <p:fade/>
       </p:transition>
     </mc:Choice>
-    <mc:Fallback>
+    <mc:Fallback xmlns="">
       <p:transition spd="med">
         <p:fade/>
       </p:transition>

</xml_diff>

<commit_message>
Docker: Presentation and README
</commit_message>
<xml_diff>
--- a/intro-docker/presentation/intro-to-docker.pptx
+++ b/intro-docker/presentation/intro-to-docker.pptx
@@ -5,7 +5,7 @@
     <p:sldMasterId id="2147484471" r:id="rId1"/>
   </p:sldMasterIdLst>
   <p:notesMasterIdLst>
-    <p:notesMasterId r:id="rId14"/>
+    <p:notesMasterId r:id="rId26"/>
   </p:notesMasterIdLst>
   <p:sldIdLst>
     <p:sldId id="256" r:id="rId2"/>
@@ -17,9 +17,21 @@
     <p:sldId id="261" r:id="rId8"/>
     <p:sldId id="264" r:id="rId9"/>
     <p:sldId id="263" r:id="rId10"/>
-    <p:sldId id="265" r:id="rId11"/>
-    <p:sldId id="266" r:id="rId12"/>
-    <p:sldId id="267" r:id="rId13"/>
+    <p:sldId id="268" r:id="rId11"/>
+    <p:sldId id="269" r:id="rId12"/>
+    <p:sldId id="270" r:id="rId13"/>
+    <p:sldId id="271" r:id="rId14"/>
+    <p:sldId id="272" r:id="rId15"/>
+    <p:sldId id="273" r:id="rId16"/>
+    <p:sldId id="274" r:id="rId17"/>
+    <p:sldId id="275" r:id="rId18"/>
+    <p:sldId id="276" r:id="rId19"/>
+    <p:sldId id="277" r:id="rId20"/>
+    <p:sldId id="278" r:id="rId21"/>
+    <p:sldId id="279" r:id="rId22"/>
+    <p:sldId id="265" r:id="rId23"/>
+    <p:sldId id="266" r:id="rId24"/>
+    <p:sldId id="267" r:id="rId25"/>
   </p:sldIdLst>
   <p:sldSz cx="12192000" cy="6858000"/>
   <p:notesSz cx="6858000" cy="9144000"/>
@@ -6318,7 +6330,7 @@
           <p:cNvPr id="2" name="Title 1">
             <a:extLst>
               <a:ext uri="{FF2B5EF4-FFF2-40B4-BE49-F238E27FC236}">
-                <a16:creationId xmlns:a16="http://schemas.microsoft.com/office/drawing/2014/main" id="{8E6263C1-CA40-5BC9-92AA-7D371D38B9AF}"/>
+                <a16:creationId xmlns:a16="http://schemas.microsoft.com/office/drawing/2014/main" id="{C47EEB31-7BEE-7D00-E2B0-853DA07C4D1F}"/>
               </a:ext>
             </a:extLst>
           </p:cNvPr>
@@ -6336,17 +6348,17 @@
           <a:p>
             <a:r>
               <a:rPr lang="en-US" dirty="0"/>
-              <a:t>A Few Takeaways</a:t>
+              <a:t>Launching Our First Container</a:t>
             </a:r>
           </a:p>
         </p:txBody>
       </p:sp>
       <p:sp>
         <p:nvSpPr>
-          <p:cNvPr id="3" name="Text Placeholder 2">
+          <p:cNvPr id="3" name="Content Placeholder 2">
             <a:extLst>
               <a:ext uri="{FF2B5EF4-FFF2-40B4-BE49-F238E27FC236}">
-                <a16:creationId xmlns:a16="http://schemas.microsoft.com/office/drawing/2014/main" id="{DBD593F8-5240-91FB-2F56-6D03F20498F4}"/>
+                <a16:creationId xmlns:a16="http://schemas.microsoft.com/office/drawing/2014/main" id="{5AD1D88E-ACC4-D72B-5227-6C0CB0224F38}"/>
               </a:ext>
             </a:extLst>
           </p:cNvPr>
@@ -6354,7 +6366,7 @@
             <a:spLocks noGrp="1"/>
           </p:cNvSpPr>
           <p:nvPr>
-            <p:ph type="body" idx="1"/>
+            <p:ph idx="1"/>
           </p:nvPr>
         </p:nvSpPr>
         <p:spPr/>
@@ -6362,14 +6374,29 @@
           <a:bodyPr/>
           <a:lstStyle/>
           <a:p>
-            <a:endParaRPr lang="en-US"/>
+            <a:r>
+              <a:rPr lang="en-US" dirty="0"/>
+              <a:t>To launch a container we need to use an image</a:t>
+            </a:r>
+          </a:p>
+          <a:p>
+            <a:r>
+              <a:rPr lang="en-US" dirty="0"/>
+              <a:t>An image is a “Template” for the container</a:t>
+            </a:r>
+          </a:p>
+          <a:p>
+            <a:r>
+              <a:rPr lang="en-US" dirty="0"/>
+              <a:t>Can use the same image for multiple containers</a:t>
+            </a:r>
           </a:p>
         </p:txBody>
       </p:sp>
     </p:spTree>
     <p:extLst>
       <p:ext uri="{BB962C8B-B14F-4D97-AF65-F5344CB8AC3E}">
-        <p14:creationId xmlns:p14="http://schemas.microsoft.com/office/powerpoint/2010/main" val="2858677990"/>
+        <p14:creationId xmlns:p14="http://schemas.microsoft.com/office/powerpoint/2010/main" val="1057067137"/>
       </p:ext>
     </p:extLst>
   </p:cSld>
@@ -6413,7 +6440,7 @@
           <p:cNvPr id="2" name="Title 1">
             <a:extLst>
               <a:ext uri="{FF2B5EF4-FFF2-40B4-BE49-F238E27FC236}">
-                <a16:creationId xmlns:a16="http://schemas.microsoft.com/office/drawing/2014/main" id="{DD13BAF0-C6D0-6C35-7E1E-54E8C803D102}"/>
+                <a16:creationId xmlns:a16="http://schemas.microsoft.com/office/drawing/2014/main" id="{37E037C0-26E8-38D9-5F0B-97A758940B80}"/>
               </a:ext>
             </a:extLst>
           </p:cNvPr>
@@ -6431,7 +6458,7 @@
           <a:p>
             <a:r>
               <a:rPr lang="en-US" dirty="0"/>
-              <a:t>A Few Takeaways</a:t>
+              <a:t>Launching Our First Container</a:t>
             </a:r>
           </a:p>
         </p:txBody>
@@ -6441,7 +6468,7 @@
           <p:cNvPr id="3" name="Content Placeholder 2">
             <a:extLst>
               <a:ext uri="{FF2B5EF4-FFF2-40B4-BE49-F238E27FC236}">
-                <a16:creationId xmlns:a16="http://schemas.microsoft.com/office/drawing/2014/main" id="{F948990A-5766-F5D5-B6C4-E83EC504FDAF}"/>
+                <a16:creationId xmlns:a16="http://schemas.microsoft.com/office/drawing/2014/main" id="{501A5877-1E77-C320-A7C8-BA3CE6670D64}"/>
               </a:ext>
             </a:extLst>
           </p:cNvPr>
@@ -6452,26 +6479,313 @@
             <p:ph idx="1"/>
           </p:nvPr>
         </p:nvSpPr>
-        <p:spPr/>
+        <p:spPr>
+          <a:xfrm>
+            <a:off x="1881396" y="2222287"/>
+            <a:ext cx="2221047" cy="3636511"/>
+          </a:xfrm>
+        </p:spPr>
         <p:txBody>
           <a:bodyPr/>
           <a:lstStyle/>
           <a:p>
             <a:r>
               <a:rPr lang="en-US" dirty="0"/>
-              <a:t>Practice will help you remember, but…</a:t>
+              <a:t>docker run </a:t>
             </a:r>
           </a:p>
           <a:p>
             <a:r>
               <a:rPr lang="en-US" dirty="0"/>
-              <a:t>It’s okay if you don’t remember everything!</a:t>
+              <a:t>docker images</a:t>
             </a:r>
           </a:p>
           <a:p>
             <a:r>
               <a:rPr lang="en-US" dirty="0"/>
-              <a:t>Strive to learn new things and be patient</a:t>
+              <a:t>docker pull</a:t>
+            </a:r>
+          </a:p>
+          <a:p>
+            <a:r>
+              <a:rPr lang="en-US" dirty="0"/>
+              <a:t>docker </a:t>
+            </a:r>
+            <a:r>
+              <a:rPr lang="en-US" dirty="0" err="1"/>
+              <a:t>ps</a:t>
+            </a:r>
+            <a:endParaRPr lang="en-US" dirty="0"/>
+          </a:p>
+          <a:p>
+            <a:r>
+              <a:rPr lang="en-US" dirty="0"/>
+              <a:t>docker logs</a:t>
+            </a:r>
+          </a:p>
+        </p:txBody>
+      </p:sp>
+      <p:sp>
+        <p:nvSpPr>
+          <p:cNvPr id="4" name="Content Placeholder 2">
+            <a:extLst>
+              <a:ext uri="{FF2B5EF4-FFF2-40B4-BE49-F238E27FC236}">
+                <a16:creationId xmlns:a16="http://schemas.microsoft.com/office/drawing/2014/main" id="{E7B8E581-808B-B8FB-CEF5-BE225F447D3F}"/>
+              </a:ext>
+            </a:extLst>
+          </p:cNvPr>
+          <p:cNvSpPr txBox="1">
+            <a:spLocks/>
+          </p:cNvSpPr>
+          <p:nvPr/>
+        </p:nvSpPr>
+        <p:spPr>
+          <a:xfrm>
+            <a:off x="6210389" y="2226403"/>
+            <a:ext cx="10554574" cy="3636511"/>
+          </a:xfrm>
+          <a:prstGeom prst="rect">
+            <a:avLst/>
+          </a:prstGeom>
+          <a:effectLst>
+            <a:outerShdw blurRad="50800" dir="14400000">
+              <a:srgbClr val="000000">
+                <a:alpha val="40000"/>
+              </a:srgbClr>
+            </a:outerShdw>
+          </a:effectLst>
+        </p:spPr>
+        <p:txBody>
+          <a:bodyPr vert="horz" lIns="91440" tIns="45720" rIns="91440" bIns="45720" rtlCol="0" anchor="ctr">
+            <a:normAutofit/>
+          </a:bodyPr>
+          <a:lstStyle>
+            <a:lvl1pPr marL="342900" indent="-342900" algn="l" defTabSz="457200" rtl="0" eaLnBrk="1" latinLnBrk="0" hangingPunct="1">
+              <a:spcBef>
+                <a:spcPct val="20000"/>
+              </a:spcBef>
+              <a:spcAft>
+                <a:spcPts val="600"/>
+              </a:spcAft>
+              <a:buClr>
+                <a:schemeClr val="accent1"/>
+              </a:buClr>
+              <a:buFont typeface="Wingdings 2" charset="2"/>
+              <a:buChar char=""/>
+              <a:defRPr sz="1800" kern="1200">
+                <a:solidFill>
+                  <a:schemeClr val="tx1"/>
+                </a:solidFill>
+                <a:latin typeface="+mn-lt"/>
+                <a:ea typeface="+mn-ea"/>
+                <a:cs typeface="+mn-cs"/>
+              </a:defRPr>
+            </a:lvl1pPr>
+            <a:lvl2pPr marL="742950" indent="-285750" algn="l" defTabSz="457200" rtl="0" eaLnBrk="1" latinLnBrk="0" hangingPunct="1">
+              <a:spcBef>
+                <a:spcPct val="20000"/>
+              </a:spcBef>
+              <a:spcAft>
+                <a:spcPts val="600"/>
+              </a:spcAft>
+              <a:buClr>
+                <a:schemeClr val="accent1"/>
+              </a:buClr>
+              <a:buFont typeface="Wingdings 2" charset="2"/>
+              <a:buChar char=""/>
+              <a:defRPr sz="1600" kern="1200">
+                <a:solidFill>
+                  <a:schemeClr val="tx1"/>
+                </a:solidFill>
+                <a:latin typeface="+mn-lt"/>
+                <a:ea typeface="+mn-ea"/>
+                <a:cs typeface="+mn-cs"/>
+              </a:defRPr>
+            </a:lvl2pPr>
+            <a:lvl3pPr marL="1143000" indent="-228600" algn="l" defTabSz="457200" rtl="0" eaLnBrk="1" latinLnBrk="0" hangingPunct="1">
+              <a:spcBef>
+                <a:spcPct val="20000"/>
+              </a:spcBef>
+              <a:spcAft>
+                <a:spcPts val="600"/>
+              </a:spcAft>
+              <a:buClr>
+                <a:schemeClr val="accent1"/>
+              </a:buClr>
+              <a:buFont typeface="Wingdings 2" charset="2"/>
+              <a:buChar char=""/>
+              <a:defRPr sz="1400" kern="1200">
+                <a:solidFill>
+                  <a:schemeClr val="tx1"/>
+                </a:solidFill>
+                <a:latin typeface="+mn-lt"/>
+                <a:ea typeface="+mn-ea"/>
+                <a:cs typeface="+mn-cs"/>
+              </a:defRPr>
+            </a:lvl3pPr>
+            <a:lvl4pPr marL="1600200" indent="-228600" algn="l" defTabSz="457200" rtl="0" eaLnBrk="1" latinLnBrk="0" hangingPunct="1">
+              <a:spcBef>
+                <a:spcPct val="20000"/>
+              </a:spcBef>
+              <a:spcAft>
+                <a:spcPts val="600"/>
+              </a:spcAft>
+              <a:buClr>
+                <a:schemeClr val="accent1"/>
+              </a:buClr>
+              <a:buFont typeface="Wingdings 2" charset="2"/>
+              <a:buChar char=""/>
+              <a:defRPr sz="1200" kern="1200">
+                <a:solidFill>
+                  <a:schemeClr val="tx1"/>
+                </a:solidFill>
+                <a:latin typeface="+mn-lt"/>
+                <a:ea typeface="+mn-ea"/>
+                <a:cs typeface="+mn-cs"/>
+              </a:defRPr>
+            </a:lvl4pPr>
+            <a:lvl5pPr marL="2057400" indent="-228600" algn="l" defTabSz="457200" rtl="0" eaLnBrk="1" latinLnBrk="0" hangingPunct="1">
+              <a:spcBef>
+                <a:spcPct val="20000"/>
+              </a:spcBef>
+              <a:spcAft>
+                <a:spcPts val="600"/>
+              </a:spcAft>
+              <a:buClr>
+                <a:schemeClr val="accent1"/>
+              </a:buClr>
+              <a:buFont typeface="Wingdings 2" charset="2"/>
+              <a:buChar char=""/>
+              <a:defRPr sz="1200" kern="1200">
+                <a:solidFill>
+                  <a:schemeClr val="tx1"/>
+                </a:solidFill>
+                <a:latin typeface="+mn-lt"/>
+                <a:ea typeface="+mn-ea"/>
+                <a:cs typeface="+mn-cs"/>
+              </a:defRPr>
+            </a:lvl5pPr>
+            <a:lvl6pPr marL="2400000" indent="-228600" algn="l" defTabSz="457200" rtl="0" eaLnBrk="1" latinLnBrk="0" hangingPunct="1">
+              <a:spcBef>
+                <a:spcPct val="20000"/>
+              </a:spcBef>
+              <a:spcAft>
+                <a:spcPts val="600"/>
+              </a:spcAft>
+              <a:buClr>
+                <a:schemeClr val="accent1"/>
+              </a:buClr>
+              <a:buFont typeface="Wingdings 2" charset="2"/>
+              <a:buChar char=""/>
+              <a:defRPr sz="1200" kern="1200">
+                <a:solidFill>
+                  <a:schemeClr val="tx1"/>
+                </a:solidFill>
+                <a:latin typeface="+mn-lt"/>
+                <a:ea typeface="+mn-ea"/>
+                <a:cs typeface="+mn-cs"/>
+              </a:defRPr>
+            </a:lvl6pPr>
+            <a:lvl7pPr marL="2800000" indent="-228600" algn="l" defTabSz="457200" rtl="0" eaLnBrk="1" latinLnBrk="0" hangingPunct="1">
+              <a:spcBef>
+                <a:spcPct val="20000"/>
+              </a:spcBef>
+              <a:spcAft>
+                <a:spcPts val="600"/>
+              </a:spcAft>
+              <a:buClr>
+                <a:schemeClr val="accent1"/>
+              </a:buClr>
+              <a:buFont typeface="Wingdings 2" charset="2"/>
+              <a:buChar char=""/>
+              <a:defRPr sz="1200" kern="1200">
+                <a:solidFill>
+                  <a:schemeClr val="tx1"/>
+                </a:solidFill>
+                <a:latin typeface="+mn-lt"/>
+                <a:ea typeface="+mn-ea"/>
+                <a:cs typeface="+mn-cs"/>
+              </a:defRPr>
+            </a:lvl7pPr>
+            <a:lvl8pPr marL="3200000" indent="-228600" algn="l" defTabSz="457200" rtl="0" eaLnBrk="1" latinLnBrk="0" hangingPunct="1">
+              <a:spcBef>
+                <a:spcPct val="20000"/>
+              </a:spcBef>
+              <a:spcAft>
+                <a:spcPts val="600"/>
+              </a:spcAft>
+              <a:buClr>
+                <a:schemeClr val="accent1"/>
+              </a:buClr>
+              <a:buFont typeface="Wingdings 2" charset="2"/>
+              <a:buChar char=""/>
+              <a:defRPr sz="1200" kern="1200">
+                <a:solidFill>
+                  <a:schemeClr val="tx1"/>
+                </a:solidFill>
+                <a:latin typeface="+mn-lt"/>
+                <a:ea typeface="+mn-ea"/>
+                <a:cs typeface="+mn-cs"/>
+              </a:defRPr>
+            </a:lvl8pPr>
+            <a:lvl9pPr marL="3600000" indent="-228600" algn="l" defTabSz="457200" rtl="0" eaLnBrk="1" latinLnBrk="0" hangingPunct="1">
+              <a:spcBef>
+                <a:spcPct val="20000"/>
+              </a:spcBef>
+              <a:spcAft>
+                <a:spcPts val="600"/>
+              </a:spcAft>
+              <a:buClr>
+                <a:schemeClr val="accent1"/>
+              </a:buClr>
+              <a:buFont typeface="Wingdings 2" charset="2"/>
+              <a:buChar char=""/>
+              <a:defRPr sz="1200" kern="1200">
+                <a:solidFill>
+                  <a:schemeClr val="tx1"/>
+                </a:solidFill>
+                <a:latin typeface="+mn-lt"/>
+                <a:ea typeface="+mn-ea"/>
+                <a:cs typeface="+mn-cs"/>
+              </a:defRPr>
+            </a:lvl9pPr>
+          </a:lstStyle>
+          <a:p>
+            <a:r>
+              <a:rPr lang="en-US" dirty="0"/>
+              <a:t>Ex. docker run hello-world</a:t>
+            </a:r>
+          </a:p>
+          <a:p>
+            <a:r>
+              <a:rPr lang="en-US" dirty="0"/>
+              <a:t>Ex. docker images</a:t>
+            </a:r>
+          </a:p>
+          <a:p>
+            <a:r>
+              <a:rPr lang="en-US" dirty="0"/>
+              <a:t>Ex. docker pull python</a:t>
+            </a:r>
+          </a:p>
+          <a:p>
+            <a:r>
+              <a:rPr lang="en-US" dirty="0"/>
+              <a:t>Ex. docker </a:t>
+            </a:r>
+            <a:r>
+              <a:rPr lang="en-US" dirty="0" err="1"/>
+              <a:t>ps</a:t>
+            </a:r>
+            <a:r>
+              <a:rPr lang="en-US" dirty="0"/>
+              <a:t> -a</a:t>
+            </a:r>
+          </a:p>
+          <a:p>
+            <a:r>
+              <a:rPr lang="en-US" dirty="0"/>
+              <a:t>Ex. docker logs e3</a:t>
             </a:r>
           </a:p>
         </p:txBody>
@@ -6479,7 +6793,7 @@
     </p:spTree>
     <p:extLst>
       <p:ext uri="{BB962C8B-B14F-4D97-AF65-F5344CB8AC3E}">
-        <p14:creationId xmlns:p14="http://schemas.microsoft.com/office/powerpoint/2010/main" val="1870428455"/>
+        <p14:creationId xmlns:p14="http://schemas.microsoft.com/office/powerpoint/2010/main" val="2262822797"/>
       </p:ext>
     </p:extLst>
   </p:cSld>
@@ -6523,7 +6837,7 @@
           <p:cNvPr id="2" name="Title 1">
             <a:extLst>
               <a:ext uri="{FF2B5EF4-FFF2-40B4-BE49-F238E27FC236}">
-                <a16:creationId xmlns:a16="http://schemas.microsoft.com/office/drawing/2014/main" id="{DFAE9FAE-F47D-0E93-67EB-E210274D0472}"/>
+                <a16:creationId xmlns:a16="http://schemas.microsoft.com/office/drawing/2014/main" id="{37E037C0-26E8-38D9-5F0B-97A758940B80}"/>
               </a:ext>
             </a:extLst>
           </p:cNvPr>
@@ -6541,17 +6855,17 @@
           <a:p>
             <a:r>
               <a:rPr lang="en-US" dirty="0"/>
-              <a:t>Thank you for attending!</a:t>
+              <a:t>Cleaning Up</a:t>
             </a:r>
           </a:p>
         </p:txBody>
       </p:sp>
       <p:sp>
         <p:nvSpPr>
-          <p:cNvPr id="3" name="Text Placeholder 2">
+          <p:cNvPr id="3" name="Content Placeholder 2">
             <a:extLst>
               <a:ext uri="{FF2B5EF4-FFF2-40B4-BE49-F238E27FC236}">
-                <a16:creationId xmlns:a16="http://schemas.microsoft.com/office/drawing/2014/main" id="{8B91F699-C506-8E7A-4B6D-B0CC5DD14AE1}"/>
+                <a16:creationId xmlns:a16="http://schemas.microsoft.com/office/drawing/2014/main" id="{501A5877-1E77-C320-A7C8-BA3CE6670D64}"/>
               </a:ext>
             </a:extLst>
           </p:cNvPr>
@@ -6559,7 +6873,355 @@
             <a:spLocks noGrp="1"/>
           </p:cNvSpPr>
           <p:nvPr>
-            <p:ph type="body" idx="1"/>
+            <p:ph idx="1"/>
+          </p:nvPr>
+        </p:nvSpPr>
+        <p:spPr>
+          <a:xfrm>
+            <a:off x="1881395" y="2222287"/>
+            <a:ext cx="2319901" cy="3636511"/>
+          </a:xfrm>
+        </p:spPr>
+        <p:txBody>
+          <a:bodyPr/>
+          <a:lstStyle/>
+          <a:p>
+            <a:r>
+              <a:rPr lang="en-US" dirty="0"/>
+              <a:t>docker </a:t>
+            </a:r>
+            <a:r>
+              <a:rPr lang="en-US" dirty="0" err="1"/>
+              <a:t>rmi</a:t>
+            </a:r>
+            <a:r>
+              <a:rPr lang="en-US" dirty="0"/>
+              <a:t> </a:t>
+            </a:r>
+          </a:p>
+          <a:p>
+            <a:r>
+              <a:rPr lang="en-US" dirty="0"/>
+              <a:t>docker rm</a:t>
+            </a:r>
+          </a:p>
+          <a:p>
+            <a:r>
+              <a:rPr lang="en-US" dirty="0"/>
+              <a:t>docker stop/kill</a:t>
+            </a:r>
+          </a:p>
+        </p:txBody>
+      </p:sp>
+      <p:sp>
+        <p:nvSpPr>
+          <p:cNvPr id="4" name="Content Placeholder 2">
+            <a:extLst>
+              <a:ext uri="{FF2B5EF4-FFF2-40B4-BE49-F238E27FC236}">
+                <a16:creationId xmlns:a16="http://schemas.microsoft.com/office/drawing/2014/main" id="{E7B8E581-808B-B8FB-CEF5-BE225F447D3F}"/>
+              </a:ext>
+            </a:extLst>
+          </p:cNvPr>
+          <p:cNvSpPr txBox="1">
+            <a:spLocks/>
+          </p:cNvSpPr>
+          <p:nvPr/>
+        </p:nvSpPr>
+        <p:spPr>
+          <a:xfrm>
+            <a:off x="6210389" y="2226403"/>
+            <a:ext cx="10554574" cy="3636511"/>
+          </a:xfrm>
+          <a:prstGeom prst="rect">
+            <a:avLst/>
+          </a:prstGeom>
+          <a:effectLst>
+            <a:outerShdw blurRad="50800" dir="14400000">
+              <a:srgbClr val="000000">
+                <a:alpha val="40000"/>
+              </a:srgbClr>
+            </a:outerShdw>
+          </a:effectLst>
+        </p:spPr>
+        <p:txBody>
+          <a:bodyPr vert="horz" lIns="91440" tIns="45720" rIns="91440" bIns="45720" rtlCol="0" anchor="ctr">
+            <a:normAutofit/>
+          </a:bodyPr>
+          <a:lstStyle>
+            <a:lvl1pPr marL="342900" indent="-342900" algn="l" defTabSz="457200" rtl="0" eaLnBrk="1" latinLnBrk="0" hangingPunct="1">
+              <a:spcBef>
+                <a:spcPct val="20000"/>
+              </a:spcBef>
+              <a:spcAft>
+                <a:spcPts val="600"/>
+              </a:spcAft>
+              <a:buClr>
+                <a:schemeClr val="accent1"/>
+              </a:buClr>
+              <a:buFont typeface="Wingdings 2" charset="2"/>
+              <a:buChar char=""/>
+              <a:defRPr sz="1800" kern="1200">
+                <a:solidFill>
+                  <a:schemeClr val="tx1"/>
+                </a:solidFill>
+                <a:latin typeface="+mn-lt"/>
+                <a:ea typeface="+mn-ea"/>
+                <a:cs typeface="+mn-cs"/>
+              </a:defRPr>
+            </a:lvl1pPr>
+            <a:lvl2pPr marL="742950" indent="-285750" algn="l" defTabSz="457200" rtl="0" eaLnBrk="1" latinLnBrk="0" hangingPunct="1">
+              <a:spcBef>
+                <a:spcPct val="20000"/>
+              </a:spcBef>
+              <a:spcAft>
+                <a:spcPts val="600"/>
+              </a:spcAft>
+              <a:buClr>
+                <a:schemeClr val="accent1"/>
+              </a:buClr>
+              <a:buFont typeface="Wingdings 2" charset="2"/>
+              <a:buChar char=""/>
+              <a:defRPr sz="1600" kern="1200">
+                <a:solidFill>
+                  <a:schemeClr val="tx1"/>
+                </a:solidFill>
+                <a:latin typeface="+mn-lt"/>
+                <a:ea typeface="+mn-ea"/>
+                <a:cs typeface="+mn-cs"/>
+              </a:defRPr>
+            </a:lvl2pPr>
+            <a:lvl3pPr marL="1143000" indent="-228600" algn="l" defTabSz="457200" rtl="0" eaLnBrk="1" latinLnBrk="0" hangingPunct="1">
+              <a:spcBef>
+                <a:spcPct val="20000"/>
+              </a:spcBef>
+              <a:spcAft>
+                <a:spcPts val="600"/>
+              </a:spcAft>
+              <a:buClr>
+                <a:schemeClr val="accent1"/>
+              </a:buClr>
+              <a:buFont typeface="Wingdings 2" charset="2"/>
+              <a:buChar char=""/>
+              <a:defRPr sz="1400" kern="1200">
+                <a:solidFill>
+                  <a:schemeClr val="tx1"/>
+                </a:solidFill>
+                <a:latin typeface="+mn-lt"/>
+                <a:ea typeface="+mn-ea"/>
+                <a:cs typeface="+mn-cs"/>
+              </a:defRPr>
+            </a:lvl3pPr>
+            <a:lvl4pPr marL="1600200" indent="-228600" algn="l" defTabSz="457200" rtl="0" eaLnBrk="1" latinLnBrk="0" hangingPunct="1">
+              <a:spcBef>
+                <a:spcPct val="20000"/>
+              </a:spcBef>
+              <a:spcAft>
+                <a:spcPts val="600"/>
+              </a:spcAft>
+              <a:buClr>
+                <a:schemeClr val="accent1"/>
+              </a:buClr>
+              <a:buFont typeface="Wingdings 2" charset="2"/>
+              <a:buChar char=""/>
+              <a:defRPr sz="1200" kern="1200">
+                <a:solidFill>
+                  <a:schemeClr val="tx1"/>
+                </a:solidFill>
+                <a:latin typeface="+mn-lt"/>
+                <a:ea typeface="+mn-ea"/>
+                <a:cs typeface="+mn-cs"/>
+              </a:defRPr>
+            </a:lvl4pPr>
+            <a:lvl5pPr marL="2057400" indent="-228600" algn="l" defTabSz="457200" rtl="0" eaLnBrk="1" latinLnBrk="0" hangingPunct="1">
+              <a:spcBef>
+                <a:spcPct val="20000"/>
+              </a:spcBef>
+              <a:spcAft>
+                <a:spcPts val="600"/>
+              </a:spcAft>
+              <a:buClr>
+                <a:schemeClr val="accent1"/>
+              </a:buClr>
+              <a:buFont typeface="Wingdings 2" charset="2"/>
+              <a:buChar char=""/>
+              <a:defRPr sz="1200" kern="1200">
+                <a:solidFill>
+                  <a:schemeClr val="tx1"/>
+                </a:solidFill>
+                <a:latin typeface="+mn-lt"/>
+                <a:ea typeface="+mn-ea"/>
+                <a:cs typeface="+mn-cs"/>
+              </a:defRPr>
+            </a:lvl5pPr>
+            <a:lvl6pPr marL="2400000" indent="-228600" algn="l" defTabSz="457200" rtl="0" eaLnBrk="1" latinLnBrk="0" hangingPunct="1">
+              <a:spcBef>
+                <a:spcPct val="20000"/>
+              </a:spcBef>
+              <a:spcAft>
+                <a:spcPts val="600"/>
+              </a:spcAft>
+              <a:buClr>
+                <a:schemeClr val="accent1"/>
+              </a:buClr>
+              <a:buFont typeface="Wingdings 2" charset="2"/>
+              <a:buChar char=""/>
+              <a:defRPr sz="1200" kern="1200">
+                <a:solidFill>
+                  <a:schemeClr val="tx1"/>
+                </a:solidFill>
+                <a:latin typeface="+mn-lt"/>
+                <a:ea typeface="+mn-ea"/>
+                <a:cs typeface="+mn-cs"/>
+              </a:defRPr>
+            </a:lvl6pPr>
+            <a:lvl7pPr marL="2800000" indent="-228600" algn="l" defTabSz="457200" rtl="0" eaLnBrk="1" latinLnBrk="0" hangingPunct="1">
+              <a:spcBef>
+                <a:spcPct val="20000"/>
+              </a:spcBef>
+              <a:spcAft>
+                <a:spcPts val="600"/>
+              </a:spcAft>
+              <a:buClr>
+                <a:schemeClr val="accent1"/>
+              </a:buClr>
+              <a:buFont typeface="Wingdings 2" charset="2"/>
+              <a:buChar char=""/>
+              <a:defRPr sz="1200" kern="1200">
+                <a:solidFill>
+                  <a:schemeClr val="tx1"/>
+                </a:solidFill>
+                <a:latin typeface="+mn-lt"/>
+                <a:ea typeface="+mn-ea"/>
+                <a:cs typeface="+mn-cs"/>
+              </a:defRPr>
+            </a:lvl7pPr>
+            <a:lvl8pPr marL="3200000" indent="-228600" algn="l" defTabSz="457200" rtl="0" eaLnBrk="1" latinLnBrk="0" hangingPunct="1">
+              <a:spcBef>
+                <a:spcPct val="20000"/>
+              </a:spcBef>
+              <a:spcAft>
+                <a:spcPts val="600"/>
+              </a:spcAft>
+              <a:buClr>
+                <a:schemeClr val="accent1"/>
+              </a:buClr>
+              <a:buFont typeface="Wingdings 2" charset="2"/>
+              <a:buChar char=""/>
+              <a:defRPr sz="1200" kern="1200">
+                <a:solidFill>
+                  <a:schemeClr val="tx1"/>
+                </a:solidFill>
+                <a:latin typeface="+mn-lt"/>
+                <a:ea typeface="+mn-ea"/>
+                <a:cs typeface="+mn-cs"/>
+              </a:defRPr>
+            </a:lvl8pPr>
+            <a:lvl9pPr marL="3600000" indent="-228600" algn="l" defTabSz="457200" rtl="0" eaLnBrk="1" latinLnBrk="0" hangingPunct="1">
+              <a:spcBef>
+                <a:spcPct val="20000"/>
+              </a:spcBef>
+              <a:spcAft>
+                <a:spcPts val="600"/>
+              </a:spcAft>
+              <a:buClr>
+                <a:schemeClr val="accent1"/>
+              </a:buClr>
+              <a:buFont typeface="Wingdings 2" charset="2"/>
+              <a:buChar char=""/>
+              <a:defRPr sz="1200" kern="1200">
+                <a:solidFill>
+                  <a:schemeClr val="tx1"/>
+                </a:solidFill>
+                <a:latin typeface="+mn-lt"/>
+                <a:ea typeface="+mn-ea"/>
+                <a:cs typeface="+mn-cs"/>
+              </a:defRPr>
+            </a:lvl9pPr>
+          </a:lstStyle>
+          <a:p>
+            <a:r>
+              <a:rPr lang="en-US" dirty="0"/>
+              <a:t>Ex. docker </a:t>
+            </a:r>
+            <a:r>
+              <a:rPr lang="en-US" dirty="0" err="1"/>
+              <a:t>rmi</a:t>
+            </a:r>
+            <a:r>
+              <a:rPr lang="en-US" dirty="0"/>
+              <a:t> hello-world</a:t>
+            </a:r>
+          </a:p>
+          <a:p>
+            <a:r>
+              <a:rPr lang="en-US" dirty="0"/>
+              <a:t>Ex. docker rm af4</a:t>
+            </a:r>
+          </a:p>
+          <a:p>
+            <a:r>
+              <a:rPr lang="en-US" dirty="0"/>
+              <a:t>Ex. docker stop af4</a:t>
+            </a:r>
+          </a:p>
+        </p:txBody>
+      </p:sp>
+    </p:spTree>
+    <p:extLst>
+      <p:ext uri="{BB962C8B-B14F-4D97-AF65-F5344CB8AC3E}">
+        <p14:creationId xmlns:p14="http://schemas.microsoft.com/office/powerpoint/2010/main" val="1669272572"/>
+      </p:ext>
+    </p:extLst>
+  </p:cSld>
+  <p:clrMapOvr>
+    <a:masterClrMapping/>
+  </p:clrMapOvr>
+  <mc:AlternateContent xmlns:mc="http://schemas.openxmlformats.org/markup-compatibility/2006">
+    <mc:Choice xmlns:p14="http://schemas.microsoft.com/office/powerpoint/2010/main" Requires="p14">
+      <p:transition spd="med" p14:dur="700">
+        <p:fade/>
+      </p:transition>
+    </mc:Choice>
+    <mc:Fallback>
+      <p:transition spd="med">
+        <p:fade/>
+      </p:transition>
+    </mc:Fallback>
+  </mc:AlternateContent>
+</p:sld>
+</file>
+
+<file path=ppt/slides/slide13.xml><?xml version="1.0" encoding="utf-8"?>
+<p:sld xmlns:a="http://schemas.openxmlformats.org/drawingml/2006/main" xmlns:r="http://schemas.openxmlformats.org/officeDocument/2006/relationships" xmlns:p="http://schemas.openxmlformats.org/presentationml/2006/main">
+  <p:cSld>
+    <p:spTree>
+      <p:nvGrpSpPr>
+        <p:cNvPr id="1" name=""/>
+        <p:cNvGrpSpPr/>
+        <p:nvPr/>
+      </p:nvGrpSpPr>
+      <p:grpSpPr>
+        <a:xfrm>
+          <a:off x="0" y="0"/>
+          <a:ext cx="0" cy="0"/>
+          <a:chOff x="0" y="0"/>
+          <a:chExt cx="0" cy="0"/>
+        </a:xfrm>
+      </p:grpSpPr>
+      <p:sp>
+        <p:nvSpPr>
+          <p:cNvPr id="2" name="Title 1">
+            <a:extLst>
+              <a:ext uri="{FF2B5EF4-FFF2-40B4-BE49-F238E27FC236}">
+                <a16:creationId xmlns:a16="http://schemas.microsoft.com/office/drawing/2014/main" id="{37E037C0-26E8-38D9-5F0B-97A758940B80}"/>
+              </a:ext>
+            </a:extLst>
+          </p:cNvPr>
+          <p:cNvSpPr>
+            <a:spLocks noGrp="1"/>
+          </p:cNvSpPr>
+          <p:nvPr>
+            <p:ph type="title"/>
           </p:nvPr>
         </p:nvSpPr>
         <p:spPr/>
@@ -6567,14 +7229,410 @@
           <a:bodyPr/>
           <a:lstStyle/>
           <a:p>
-            <a:endParaRPr lang="en-US"/>
+            <a:r>
+              <a:rPr lang="en-US" dirty="0"/>
+              <a:t>Image Tags</a:t>
+            </a:r>
+          </a:p>
+        </p:txBody>
+      </p:sp>
+      <p:sp>
+        <p:nvSpPr>
+          <p:cNvPr id="5" name="Content Placeholder 2">
+            <a:extLst>
+              <a:ext uri="{FF2B5EF4-FFF2-40B4-BE49-F238E27FC236}">
+                <a16:creationId xmlns:a16="http://schemas.microsoft.com/office/drawing/2014/main" id="{7C5EE6A2-C123-6D3F-C85C-9581EAF3C071}"/>
+              </a:ext>
+            </a:extLst>
+          </p:cNvPr>
+          <p:cNvSpPr txBox="1">
+            <a:spLocks/>
+          </p:cNvSpPr>
+          <p:nvPr/>
+        </p:nvSpPr>
+        <p:spPr>
+          <a:xfrm>
+            <a:off x="1881394" y="2710494"/>
+            <a:ext cx="8164649" cy="3636511"/>
+          </a:xfrm>
+          <a:prstGeom prst="rect">
+            <a:avLst/>
+          </a:prstGeom>
+          <a:effectLst>
+            <a:outerShdw blurRad="50800" dir="14400000">
+              <a:srgbClr val="000000">
+                <a:alpha val="40000"/>
+              </a:srgbClr>
+            </a:outerShdw>
+          </a:effectLst>
+        </p:spPr>
+        <p:txBody>
+          <a:bodyPr vert="horz" lIns="91440" tIns="45720" rIns="91440" bIns="45720" rtlCol="0" anchor="ctr">
+            <a:normAutofit/>
+          </a:bodyPr>
+          <a:lstStyle>
+            <a:lvl1pPr marL="342900" indent="-342900" algn="l" defTabSz="457200" rtl="0" eaLnBrk="1" latinLnBrk="0" hangingPunct="1">
+              <a:spcBef>
+                <a:spcPct val="20000"/>
+              </a:spcBef>
+              <a:spcAft>
+                <a:spcPts val="600"/>
+              </a:spcAft>
+              <a:buClr>
+                <a:schemeClr val="accent1"/>
+              </a:buClr>
+              <a:buFont typeface="Wingdings 2" charset="2"/>
+              <a:buChar char=""/>
+              <a:defRPr sz="1800" kern="1200">
+                <a:solidFill>
+                  <a:schemeClr val="tx1"/>
+                </a:solidFill>
+                <a:latin typeface="+mn-lt"/>
+                <a:ea typeface="+mn-ea"/>
+                <a:cs typeface="+mn-cs"/>
+              </a:defRPr>
+            </a:lvl1pPr>
+            <a:lvl2pPr marL="742950" indent="-285750" algn="l" defTabSz="457200" rtl="0" eaLnBrk="1" latinLnBrk="0" hangingPunct="1">
+              <a:spcBef>
+                <a:spcPct val="20000"/>
+              </a:spcBef>
+              <a:spcAft>
+                <a:spcPts val="600"/>
+              </a:spcAft>
+              <a:buClr>
+                <a:schemeClr val="accent1"/>
+              </a:buClr>
+              <a:buFont typeface="Wingdings 2" charset="2"/>
+              <a:buChar char=""/>
+              <a:defRPr sz="1600" kern="1200">
+                <a:solidFill>
+                  <a:schemeClr val="tx1"/>
+                </a:solidFill>
+                <a:latin typeface="+mn-lt"/>
+                <a:ea typeface="+mn-ea"/>
+                <a:cs typeface="+mn-cs"/>
+              </a:defRPr>
+            </a:lvl2pPr>
+            <a:lvl3pPr marL="1143000" indent="-228600" algn="l" defTabSz="457200" rtl="0" eaLnBrk="1" latinLnBrk="0" hangingPunct="1">
+              <a:spcBef>
+                <a:spcPct val="20000"/>
+              </a:spcBef>
+              <a:spcAft>
+                <a:spcPts val="600"/>
+              </a:spcAft>
+              <a:buClr>
+                <a:schemeClr val="accent1"/>
+              </a:buClr>
+              <a:buFont typeface="Wingdings 2" charset="2"/>
+              <a:buChar char=""/>
+              <a:defRPr sz="1400" kern="1200">
+                <a:solidFill>
+                  <a:schemeClr val="tx1"/>
+                </a:solidFill>
+                <a:latin typeface="+mn-lt"/>
+                <a:ea typeface="+mn-ea"/>
+                <a:cs typeface="+mn-cs"/>
+              </a:defRPr>
+            </a:lvl3pPr>
+            <a:lvl4pPr marL="1600200" indent="-228600" algn="l" defTabSz="457200" rtl="0" eaLnBrk="1" latinLnBrk="0" hangingPunct="1">
+              <a:spcBef>
+                <a:spcPct val="20000"/>
+              </a:spcBef>
+              <a:spcAft>
+                <a:spcPts val="600"/>
+              </a:spcAft>
+              <a:buClr>
+                <a:schemeClr val="accent1"/>
+              </a:buClr>
+              <a:buFont typeface="Wingdings 2" charset="2"/>
+              <a:buChar char=""/>
+              <a:defRPr sz="1200" kern="1200">
+                <a:solidFill>
+                  <a:schemeClr val="tx1"/>
+                </a:solidFill>
+                <a:latin typeface="+mn-lt"/>
+                <a:ea typeface="+mn-ea"/>
+                <a:cs typeface="+mn-cs"/>
+              </a:defRPr>
+            </a:lvl4pPr>
+            <a:lvl5pPr marL="2057400" indent="-228600" algn="l" defTabSz="457200" rtl="0" eaLnBrk="1" latinLnBrk="0" hangingPunct="1">
+              <a:spcBef>
+                <a:spcPct val="20000"/>
+              </a:spcBef>
+              <a:spcAft>
+                <a:spcPts val="600"/>
+              </a:spcAft>
+              <a:buClr>
+                <a:schemeClr val="accent1"/>
+              </a:buClr>
+              <a:buFont typeface="Wingdings 2" charset="2"/>
+              <a:buChar char=""/>
+              <a:defRPr sz="1200" kern="1200">
+                <a:solidFill>
+                  <a:schemeClr val="tx1"/>
+                </a:solidFill>
+                <a:latin typeface="+mn-lt"/>
+                <a:ea typeface="+mn-ea"/>
+                <a:cs typeface="+mn-cs"/>
+              </a:defRPr>
+            </a:lvl5pPr>
+            <a:lvl6pPr marL="2400000" indent="-228600" algn="l" defTabSz="457200" rtl="0" eaLnBrk="1" latinLnBrk="0" hangingPunct="1">
+              <a:spcBef>
+                <a:spcPct val="20000"/>
+              </a:spcBef>
+              <a:spcAft>
+                <a:spcPts val="600"/>
+              </a:spcAft>
+              <a:buClr>
+                <a:schemeClr val="accent1"/>
+              </a:buClr>
+              <a:buFont typeface="Wingdings 2" charset="2"/>
+              <a:buChar char=""/>
+              <a:defRPr sz="1200" kern="1200">
+                <a:solidFill>
+                  <a:schemeClr val="tx1"/>
+                </a:solidFill>
+                <a:latin typeface="+mn-lt"/>
+                <a:ea typeface="+mn-ea"/>
+                <a:cs typeface="+mn-cs"/>
+              </a:defRPr>
+            </a:lvl6pPr>
+            <a:lvl7pPr marL="2800000" indent="-228600" algn="l" defTabSz="457200" rtl="0" eaLnBrk="1" latinLnBrk="0" hangingPunct="1">
+              <a:spcBef>
+                <a:spcPct val="20000"/>
+              </a:spcBef>
+              <a:spcAft>
+                <a:spcPts val="600"/>
+              </a:spcAft>
+              <a:buClr>
+                <a:schemeClr val="accent1"/>
+              </a:buClr>
+              <a:buFont typeface="Wingdings 2" charset="2"/>
+              <a:buChar char=""/>
+              <a:defRPr sz="1200" kern="1200">
+                <a:solidFill>
+                  <a:schemeClr val="tx1"/>
+                </a:solidFill>
+                <a:latin typeface="+mn-lt"/>
+                <a:ea typeface="+mn-ea"/>
+                <a:cs typeface="+mn-cs"/>
+              </a:defRPr>
+            </a:lvl7pPr>
+            <a:lvl8pPr marL="3200000" indent="-228600" algn="l" defTabSz="457200" rtl="0" eaLnBrk="1" latinLnBrk="0" hangingPunct="1">
+              <a:spcBef>
+                <a:spcPct val="20000"/>
+              </a:spcBef>
+              <a:spcAft>
+                <a:spcPts val="600"/>
+              </a:spcAft>
+              <a:buClr>
+                <a:schemeClr val="accent1"/>
+              </a:buClr>
+              <a:buFont typeface="Wingdings 2" charset="2"/>
+              <a:buChar char=""/>
+              <a:defRPr sz="1200" kern="1200">
+                <a:solidFill>
+                  <a:schemeClr val="tx1"/>
+                </a:solidFill>
+                <a:latin typeface="+mn-lt"/>
+                <a:ea typeface="+mn-ea"/>
+                <a:cs typeface="+mn-cs"/>
+              </a:defRPr>
+            </a:lvl8pPr>
+            <a:lvl9pPr marL="3600000" indent="-228600" algn="l" defTabSz="457200" rtl="0" eaLnBrk="1" latinLnBrk="0" hangingPunct="1">
+              <a:spcBef>
+                <a:spcPct val="20000"/>
+              </a:spcBef>
+              <a:spcAft>
+                <a:spcPts val="600"/>
+              </a:spcAft>
+              <a:buClr>
+                <a:schemeClr val="accent1"/>
+              </a:buClr>
+              <a:buFont typeface="Wingdings 2" charset="2"/>
+              <a:buChar char=""/>
+              <a:defRPr sz="1200" kern="1200">
+                <a:solidFill>
+                  <a:schemeClr val="tx1"/>
+                </a:solidFill>
+                <a:latin typeface="+mn-lt"/>
+                <a:ea typeface="+mn-ea"/>
+                <a:cs typeface="+mn-cs"/>
+              </a:defRPr>
+            </a:lvl9pPr>
+          </a:lstStyle>
+          <a:p>
+            <a:r>
+              <a:rPr lang="en-US" dirty="0"/>
+              <a:t>Docker images can be “versioned” using an image tag</a:t>
+            </a:r>
+          </a:p>
+          <a:p>
+            <a:r>
+              <a:rPr lang="en-US" dirty="0"/>
+              <a:t>A tag is an extra label on an image in the format </a:t>
+            </a:r>
+            <a:r>
+              <a:rPr lang="en-US" dirty="0" err="1"/>
+              <a:t>image:tag</a:t>
+            </a:r>
+            <a:endParaRPr lang="en-US" dirty="0"/>
+          </a:p>
+          <a:p>
+            <a:r>
+              <a:rPr lang="en-US" dirty="0"/>
+              <a:t>We can tag a new image using “docker tag”</a:t>
+            </a:r>
+          </a:p>
+          <a:p>
+            <a:r>
+              <a:rPr lang="en-US" dirty="0"/>
+              <a:t>Ex. docker tag python </a:t>
+            </a:r>
+            <a:r>
+              <a:rPr lang="en-US" dirty="0" err="1"/>
+              <a:t>py</a:t>
+            </a:r>
+            <a:endParaRPr lang="en-US" dirty="0"/>
+          </a:p>
+          <a:p>
+            <a:endParaRPr lang="en-US" dirty="0"/>
           </a:p>
         </p:txBody>
       </p:sp>
     </p:spTree>
     <p:extLst>
       <p:ext uri="{BB962C8B-B14F-4D97-AF65-F5344CB8AC3E}">
-        <p14:creationId xmlns:p14="http://schemas.microsoft.com/office/powerpoint/2010/main" val="2773150868"/>
+        <p14:creationId xmlns:p14="http://schemas.microsoft.com/office/powerpoint/2010/main" val="1056589184"/>
+      </p:ext>
+    </p:extLst>
+  </p:cSld>
+  <p:clrMapOvr>
+    <a:masterClrMapping/>
+  </p:clrMapOvr>
+  <mc:AlternateContent xmlns:mc="http://schemas.openxmlformats.org/markup-compatibility/2006">
+    <mc:Choice xmlns:p14="http://schemas.microsoft.com/office/powerpoint/2010/main" Requires="p14">
+      <p:transition spd="med" p14:dur="700">
+        <p:fade/>
+      </p:transition>
+    </mc:Choice>
+    <mc:Fallback>
+      <p:transition spd="med">
+        <p:fade/>
+      </p:transition>
+    </mc:Fallback>
+  </mc:AlternateContent>
+</p:sld>
+</file>
+
+<file path=ppt/slides/slide14.xml><?xml version="1.0" encoding="utf-8"?>
+<p:sld xmlns:a="http://schemas.openxmlformats.org/drawingml/2006/main" xmlns:r="http://schemas.openxmlformats.org/officeDocument/2006/relationships" xmlns:p="http://schemas.openxmlformats.org/presentationml/2006/main">
+  <p:cSld>
+    <p:spTree>
+      <p:nvGrpSpPr>
+        <p:cNvPr id="1" name=""/>
+        <p:cNvGrpSpPr/>
+        <p:nvPr/>
+      </p:nvGrpSpPr>
+      <p:grpSpPr>
+        <a:xfrm>
+          <a:off x="0" y="0"/>
+          <a:ext cx="0" cy="0"/>
+          <a:chOff x="0" y="0"/>
+          <a:chExt cx="0" cy="0"/>
+        </a:xfrm>
+      </p:grpSpPr>
+      <p:sp>
+        <p:nvSpPr>
+          <p:cNvPr id="2" name="Title 1">
+            <a:extLst>
+              <a:ext uri="{FF2B5EF4-FFF2-40B4-BE49-F238E27FC236}">
+                <a16:creationId xmlns:a16="http://schemas.microsoft.com/office/drawing/2014/main" id="{B7A5DFD5-3A40-8B40-5A85-9D9A5660C9E5}"/>
+              </a:ext>
+            </a:extLst>
+          </p:cNvPr>
+          <p:cNvSpPr>
+            <a:spLocks noGrp="1"/>
+          </p:cNvSpPr>
+          <p:nvPr>
+            <p:ph type="title"/>
+          </p:nvPr>
+        </p:nvSpPr>
+        <p:spPr/>
+        <p:txBody>
+          <a:bodyPr/>
+          <a:lstStyle/>
+          <a:p>
+            <a:r>
+              <a:rPr lang="en-US" dirty="0"/>
+              <a:t>Running Your Own Command</a:t>
+            </a:r>
+          </a:p>
+        </p:txBody>
+      </p:sp>
+      <p:sp>
+        <p:nvSpPr>
+          <p:cNvPr id="3" name="Content Placeholder 2">
+            <a:extLst>
+              <a:ext uri="{FF2B5EF4-FFF2-40B4-BE49-F238E27FC236}">
+                <a16:creationId xmlns:a16="http://schemas.microsoft.com/office/drawing/2014/main" id="{25255FEF-5BB3-EC45-9476-C0318A77A789}"/>
+              </a:ext>
+            </a:extLst>
+          </p:cNvPr>
+          <p:cNvSpPr>
+            <a:spLocks noGrp="1"/>
+          </p:cNvSpPr>
+          <p:nvPr>
+            <p:ph idx="1"/>
+          </p:nvPr>
+        </p:nvSpPr>
+        <p:spPr/>
+        <p:txBody>
+          <a:bodyPr/>
+          <a:lstStyle/>
+          <a:p>
+            <a:r>
+              <a:rPr lang="en-US" dirty="0"/>
+              <a:t>In some containers, such as python, we can specify our own command</a:t>
+            </a:r>
+          </a:p>
+          <a:p>
+            <a:r>
+              <a:rPr lang="en-US" dirty="0"/>
+              <a:t>This is done by specifying the desired command after the image name</a:t>
+            </a:r>
+          </a:p>
+          <a:p>
+            <a:r>
+              <a:rPr lang="en-US" dirty="0"/>
+              <a:t>Ex. docker run python bash</a:t>
+            </a:r>
+          </a:p>
+          <a:p>
+            <a:r>
+              <a:rPr lang="en-US" dirty="0"/>
+              <a:t>These commands may exit automatically</a:t>
+            </a:r>
+          </a:p>
+          <a:p>
+            <a:r>
+              <a:rPr lang="en-US" dirty="0"/>
+              <a:t>We may need to pass in the “-it” flags</a:t>
+            </a:r>
+          </a:p>
+          <a:p>
+            <a:pPr lvl="1"/>
+            <a:r>
+              <a:rPr lang="en-US" dirty="0"/>
+              <a:t>Intuitively, you can treat these flags as meaning “interactive”</a:t>
+            </a:r>
+          </a:p>
+        </p:txBody>
+      </p:sp>
+    </p:spTree>
+    <p:extLst>
+      <p:ext uri="{BB962C8B-B14F-4D97-AF65-F5344CB8AC3E}">
+        <p14:creationId xmlns:p14="http://schemas.microsoft.com/office/powerpoint/2010/main" val="826600574"/>
       </p:ext>
     </p:extLst>
   </p:cSld>
@@ -6588,6 +7646,674 @@
       </p:transition>
     </mc:Choice>
     <mc:Fallback xmlns="">
+      <p:transition spd="med">
+        <p:fade/>
+      </p:transition>
+    </mc:Fallback>
+  </mc:AlternateContent>
+</p:sld>
+</file>
+
+<file path=ppt/slides/slide15.xml><?xml version="1.0" encoding="utf-8"?>
+<p:sld xmlns:a="http://schemas.openxmlformats.org/drawingml/2006/main" xmlns:r="http://schemas.openxmlformats.org/officeDocument/2006/relationships" xmlns:p="http://schemas.openxmlformats.org/presentationml/2006/main">
+  <p:cSld>
+    <p:spTree>
+      <p:nvGrpSpPr>
+        <p:cNvPr id="1" name=""/>
+        <p:cNvGrpSpPr/>
+        <p:nvPr/>
+      </p:nvGrpSpPr>
+      <p:grpSpPr>
+        <a:xfrm>
+          <a:off x="0" y="0"/>
+          <a:ext cx="0" cy="0"/>
+          <a:chOff x="0" y="0"/>
+          <a:chExt cx="0" cy="0"/>
+        </a:xfrm>
+      </p:grpSpPr>
+      <p:sp>
+        <p:nvSpPr>
+          <p:cNvPr id="2" name="Title 1">
+            <a:extLst>
+              <a:ext uri="{FF2B5EF4-FFF2-40B4-BE49-F238E27FC236}">
+                <a16:creationId xmlns:a16="http://schemas.microsoft.com/office/drawing/2014/main" id="{B7A5DFD5-3A40-8B40-5A85-9D9A5660C9E5}"/>
+              </a:ext>
+            </a:extLst>
+          </p:cNvPr>
+          <p:cNvSpPr>
+            <a:spLocks noGrp="1"/>
+          </p:cNvSpPr>
+          <p:nvPr>
+            <p:ph type="title"/>
+          </p:nvPr>
+        </p:nvSpPr>
+        <p:spPr/>
+        <p:txBody>
+          <a:bodyPr/>
+          <a:lstStyle/>
+          <a:p>
+            <a:r>
+              <a:rPr lang="en-US" dirty="0"/>
+              <a:t>Saving Container Changes</a:t>
+            </a:r>
+          </a:p>
+        </p:txBody>
+      </p:sp>
+      <p:sp>
+        <p:nvSpPr>
+          <p:cNvPr id="3" name="Content Placeholder 2">
+            <a:extLst>
+              <a:ext uri="{FF2B5EF4-FFF2-40B4-BE49-F238E27FC236}">
+                <a16:creationId xmlns:a16="http://schemas.microsoft.com/office/drawing/2014/main" id="{25255FEF-5BB3-EC45-9476-C0318A77A789}"/>
+              </a:ext>
+            </a:extLst>
+          </p:cNvPr>
+          <p:cNvSpPr>
+            <a:spLocks noGrp="1"/>
+          </p:cNvSpPr>
+          <p:nvPr>
+            <p:ph idx="1"/>
+          </p:nvPr>
+        </p:nvSpPr>
+        <p:spPr/>
+        <p:txBody>
+          <a:bodyPr/>
+          <a:lstStyle/>
+          <a:p>
+            <a:r>
+              <a:rPr lang="en-US" dirty="0"/>
+              <a:t>We can save changes we make in containers</a:t>
+            </a:r>
+          </a:p>
+          <a:p>
+            <a:r>
+              <a:rPr lang="en-US" dirty="0"/>
+              <a:t>We can make a new file in a container, we can run:</a:t>
+            </a:r>
+          </a:p>
+          <a:p>
+            <a:pPr lvl="1"/>
+            <a:r>
+              <a:rPr lang="en-US" dirty="0"/>
+              <a:t>echo ’print(“Hello World”!)’ &gt; </a:t>
+            </a:r>
+            <a:r>
+              <a:rPr lang="en-US" dirty="0" err="1"/>
+              <a:t>hello.py</a:t>
+            </a:r>
+            <a:endParaRPr lang="en-US" dirty="0"/>
+          </a:p>
+          <a:p>
+            <a:r>
+              <a:rPr lang="en-US" dirty="0"/>
+              <a:t>Once the container stops, we can use ”docker commit” to save it</a:t>
+            </a:r>
+          </a:p>
+          <a:p>
+            <a:pPr lvl="1"/>
+            <a:r>
+              <a:rPr lang="en-US" dirty="0"/>
+              <a:t>Ex. docker commit &lt;CONTAINER&gt; IMAGE:TAG</a:t>
+            </a:r>
+          </a:p>
+          <a:p>
+            <a:r>
+              <a:rPr lang="en-US" dirty="0"/>
+              <a:t>This creates a new image</a:t>
+            </a:r>
+          </a:p>
+        </p:txBody>
+      </p:sp>
+    </p:spTree>
+    <p:extLst>
+      <p:ext uri="{BB962C8B-B14F-4D97-AF65-F5344CB8AC3E}">
+        <p14:creationId xmlns:p14="http://schemas.microsoft.com/office/powerpoint/2010/main" val="257408795"/>
+      </p:ext>
+    </p:extLst>
+  </p:cSld>
+  <p:clrMapOvr>
+    <a:masterClrMapping/>
+  </p:clrMapOvr>
+  <mc:AlternateContent xmlns:mc="http://schemas.openxmlformats.org/markup-compatibility/2006">
+    <mc:Choice xmlns:p14="http://schemas.microsoft.com/office/powerpoint/2010/main" Requires="p14">
+      <p:transition spd="med" p14:dur="700">
+        <p:fade/>
+      </p:transition>
+    </mc:Choice>
+    <mc:Fallback>
+      <p:transition spd="med">
+        <p:fade/>
+      </p:transition>
+    </mc:Fallback>
+  </mc:AlternateContent>
+</p:sld>
+</file>
+
+<file path=ppt/slides/slide16.xml><?xml version="1.0" encoding="utf-8"?>
+<p:sld xmlns:a="http://schemas.openxmlformats.org/drawingml/2006/main" xmlns:r="http://schemas.openxmlformats.org/officeDocument/2006/relationships" xmlns:p="http://schemas.openxmlformats.org/presentationml/2006/main">
+  <p:cSld>
+    <p:spTree>
+      <p:nvGrpSpPr>
+        <p:cNvPr id="1" name=""/>
+        <p:cNvGrpSpPr/>
+        <p:nvPr/>
+      </p:nvGrpSpPr>
+      <p:grpSpPr>
+        <a:xfrm>
+          <a:off x="0" y="0"/>
+          <a:ext cx="0" cy="0"/>
+          <a:chOff x="0" y="0"/>
+          <a:chExt cx="0" cy="0"/>
+        </a:xfrm>
+      </p:grpSpPr>
+      <p:sp>
+        <p:nvSpPr>
+          <p:cNvPr id="2" name="Title 1">
+            <a:extLst>
+              <a:ext uri="{FF2B5EF4-FFF2-40B4-BE49-F238E27FC236}">
+                <a16:creationId xmlns:a16="http://schemas.microsoft.com/office/drawing/2014/main" id="{B7A5DFD5-3A40-8B40-5A85-9D9A5660C9E5}"/>
+              </a:ext>
+            </a:extLst>
+          </p:cNvPr>
+          <p:cNvSpPr>
+            <a:spLocks noGrp="1"/>
+          </p:cNvSpPr>
+          <p:nvPr>
+            <p:ph type="title"/>
+          </p:nvPr>
+        </p:nvSpPr>
+        <p:spPr/>
+        <p:txBody>
+          <a:bodyPr/>
+          <a:lstStyle/>
+          <a:p>
+            <a:r>
+              <a:rPr lang="en-US" dirty="0"/>
+              <a:t>Bind Mounts</a:t>
+            </a:r>
+          </a:p>
+        </p:txBody>
+      </p:sp>
+      <p:sp>
+        <p:nvSpPr>
+          <p:cNvPr id="3" name="Content Placeholder 2">
+            <a:extLst>
+              <a:ext uri="{FF2B5EF4-FFF2-40B4-BE49-F238E27FC236}">
+                <a16:creationId xmlns:a16="http://schemas.microsoft.com/office/drawing/2014/main" id="{25255FEF-5BB3-EC45-9476-C0318A77A789}"/>
+              </a:ext>
+            </a:extLst>
+          </p:cNvPr>
+          <p:cNvSpPr>
+            <a:spLocks noGrp="1"/>
+          </p:cNvSpPr>
+          <p:nvPr>
+            <p:ph idx="1"/>
+          </p:nvPr>
+        </p:nvSpPr>
+        <p:spPr/>
+        <p:txBody>
+          <a:bodyPr/>
+          <a:lstStyle/>
+          <a:p>
+            <a:r>
+              <a:rPr lang="en-US" dirty="0"/>
+              <a:t>Normally containers don’t have access to Host OS files.</a:t>
+            </a:r>
+          </a:p>
+          <a:p>
+            <a:r>
+              <a:rPr lang="en-US" dirty="0"/>
+              <a:t>Can share it using bind mount:</a:t>
+            </a:r>
+          </a:p>
+          <a:p>
+            <a:pPr lvl="1"/>
+            <a:r>
+              <a:rPr lang="en-US" dirty="0"/>
+              <a:t>Done with --mount option</a:t>
+            </a:r>
+          </a:p>
+          <a:p>
+            <a:pPr lvl="1"/>
+            <a:r>
+              <a:rPr lang="en-US" dirty="0"/>
+              <a:t>Ex. –mount type=</a:t>
+            </a:r>
+            <a:r>
+              <a:rPr lang="en-US" dirty="0" err="1"/>
+              <a:t>bind,source</a:t>
+            </a:r>
+            <a:r>
+              <a:rPr lang="en-US" dirty="0"/>
+              <a:t>=</a:t>
+            </a:r>
+            <a:r>
+              <a:rPr lang="en-US" dirty="0" err="1"/>
+              <a:t>SRC,target</a:t>
+            </a:r>
+            <a:r>
+              <a:rPr lang="en-US" dirty="0"/>
+              <a:t>=DST</a:t>
+            </a:r>
+          </a:p>
+          <a:p>
+            <a:r>
+              <a:rPr lang="en-US" dirty="0"/>
+              <a:t>Changes to the files mounted in the container will be seen on the Host.</a:t>
+            </a:r>
+          </a:p>
+        </p:txBody>
+      </p:sp>
+    </p:spTree>
+    <p:extLst>
+      <p:ext uri="{BB962C8B-B14F-4D97-AF65-F5344CB8AC3E}">
+        <p14:creationId xmlns:p14="http://schemas.microsoft.com/office/powerpoint/2010/main" val="3463896996"/>
+      </p:ext>
+    </p:extLst>
+  </p:cSld>
+  <p:clrMapOvr>
+    <a:masterClrMapping/>
+  </p:clrMapOvr>
+  <mc:AlternateContent xmlns:mc="http://schemas.openxmlformats.org/markup-compatibility/2006">
+    <mc:Choice xmlns:p14="http://schemas.microsoft.com/office/powerpoint/2010/main" Requires="p14">
+      <p:transition spd="med" p14:dur="700">
+        <p:fade/>
+      </p:transition>
+    </mc:Choice>
+    <mc:Fallback>
+      <p:transition spd="med">
+        <p:fade/>
+      </p:transition>
+    </mc:Fallback>
+  </mc:AlternateContent>
+</p:sld>
+</file>
+
+<file path=ppt/slides/slide17.xml><?xml version="1.0" encoding="utf-8"?>
+<p:sld xmlns:a="http://schemas.openxmlformats.org/drawingml/2006/main" xmlns:r="http://schemas.openxmlformats.org/officeDocument/2006/relationships" xmlns:p="http://schemas.openxmlformats.org/presentationml/2006/main">
+  <p:cSld>
+    <p:spTree>
+      <p:nvGrpSpPr>
+        <p:cNvPr id="1" name=""/>
+        <p:cNvGrpSpPr/>
+        <p:nvPr/>
+      </p:nvGrpSpPr>
+      <p:grpSpPr>
+        <a:xfrm>
+          <a:off x="0" y="0"/>
+          <a:ext cx="0" cy="0"/>
+          <a:chOff x="0" y="0"/>
+          <a:chExt cx="0" cy="0"/>
+        </a:xfrm>
+      </p:grpSpPr>
+      <p:sp>
+        <p:nvSpPr>
+          <p:cNvPr id="2" name="Title 1">
+            <a:extLst>
+              <a:ext uri="{FF2B5EF4-FFF2-40B4-BE49-F238E27FC236}">
+                <a16:creationId xmlns:a16="http://schemas.microsoft.com/office/drawing/2014/main" id="{B7A5DFD5-3A40-8B40-5A85-9D9A5660C9E5}"/>
+              </a:ext>
+            </a:extLst>
+          </p:cNvPr>
+          <p:cNvSpPr>
+            <a:spLocks noGrp="1"/>
+          </p:cNvSpPr>
+          <p:nvPr>
+            <p:ph type="title"/>
+          </p:nvPr>
+        </p:nvSpPr>
+        <p:spPr/>
+        <p:txBody>
+          <a:bodyPr/>
+          <a:lstStyle/>
+          <a:p>
+            <a:r>
+              <a:rPr lang="en-US" dirty="0"/>
+              <a:t>Detaching From a Container</a:t>
+            </a:r>
+          </a:p>
+        </p:txBody>
+      </p:sp>
+      <p:sp>
+        <p:nvSpPr>
+          <p:cNvPr id="3" name="Content Placeholder 2">
+            <a:extLst>
+              <a:ext uri="{FF2B5EF4-FFF2-40B4-BE49-F238E27FC236}">
+                <a16:creationId xmlns:a16="http://schemas.microsoft.com/office/drawing/2014/main" id="{25255FEF-5BB3-EC45-9476-C0318A77A789}"/>
+              </a:ext>
+            </a:extLst>
+          </p:cNvPr>
+          <p:cNvSpPr>
+            <a:spLocks noGrp="1"/>
+          </p:cNvSpPr>
+          <p:nvPr>
+            <p:ph idx="1"/>
+          </p:nvPr>
+        </p:nvSpPr>
+        <p:spPr/>
+        <p:txBody>
+          <a:bodyPr/>
+          <a:lstStyle/>
+          <a:p>
+            <a:r>
+              <a:rPr lang="en-US" dirty="0"/>
+              <a:t>Container can run in the background</a:t>
+            </a:r>
+          </a:p>
+          <a:p>
+            <a:r>
+              <a:rPr lang="en-US" dirty="0"/>
+              <a:t>Easiest way to detach is using Ctrl-p Ctrl-q shortcut</a:t>
+            </a:r>
+          </a:p>
+          <a:p>
+            <a:r>
+              <a:rPr lang="en-US" dirty="0"/>
+              <a:t>Can also specify -d flag</a:t>
+            </a:r>
+          </a:p>
+          <a:p>
+            <a:pPr lvl="1"/>
+            <a:r>
+              <a:rPr lang="en-US" dirty="0"/>
+              <a:t>Ex. docker run -d python</a:t>
+            </a:r>
+          </a:p>
+          <a:p>
+            <a:r>
+              <a:rPr lang="en-US" dirty="0"/>
+              <a:t>Can attach using docker attach</a:t>
+            </a:r>
+          </a:p>
+          <a:p>
+            <a:pPr lvl="1"/>
+            <a:r>
+              <a:rPr lang="en-US" dirty="0"/>
+              <a:t>Ex. docker attach &lt;CONTAINER&gt;</a:t>
+            </a:r>
+          </a:p>
+        </p:txBody>
+      </p:sp>
+    </p:spTree>
+    <p:extLst>
+      <p:ext uri="{BB962C8B-B14F-4D97-AF65-F5344CB8AC3E}">
+        <p14:creationId xmlns:p14="http://schemas.microsoft.com/office/powerpoint/2010/main" val="556913911"/>
+      </p:ext>
+    </p:extLst>
+  </p:cSld>
+  <p:clrMapOvr>
+    <a:masterClrMapping/>
+  </p:clrMapOvr>
+  <mc:AlternateContent xmlns:mc="http://schemas.openxmlformats.org/markup-compatibility/2006">
+    <mc:Choice xmlns:p14="http://schemas.microsoft.com/office/powerpoint/2010/main" Requires="p14">
+      <p:transition spd="med" p14:dur="700">
+        <p:fade/>
+      </p:transition>
+    </mc:Choice>
+    <mc:Fallback>
+      <p:transition spd="med">
+        <p:fade/>
+      </p:transition>
+    </mc:Fallback>
+  </mc:AlternateContent>
+</p:sld>
+</file>
+
+<file path=ppt/slides/slide18.xml><?xml version="1.0" encoding="utf-8"?>
+<p:sld xmlns:a="http://schemas.openxmlformats.org/drawingml/2006/main" xmlns:r="http://schemas.openxmlformats.org/officeDocument/2006/relationships" xmlns:p="http://schemas.openxmlformats.org/presentationml/2006/main">
+  <p:cSld>
+    <p:spTree>
+      <p:nvGrpSpPr>
+        <p:cNvPr id="1" name=""/>
+        <p:cNvGrpSpPr/>
+        <p:nvPr/>
+      </p:nvGrpSpPr>
+      <p:grpSpPr>
+        <a:xfrm>
+          <a:off x="0" y="0"/>
+          <a:ext cx="0" cy="0"/>
+          <a:chOff x="0" y="0"/>
+          <a:chExt cx="0" cy="0"/>
+        </a:xfrm>
+      </p:grpSpPr>
+      <p:sp>
+        <p:nvSpPr>
+          <p:cNvPr id="2" name="Title 1">
+            <a:extLst>
+              <a:ext uri="{FF2B5EF4-FFF2-40B4-BE49-F238E27FC236}">
+                <a16:creationId xmlns:a16="http://schemas.microsoft.com/office/drawing/2014/main" id="{B7A5DFD5-3A40-8B40-5A85-9D9A5660C9E5}"/>
+              </a:ext>
+            </a:extLst>
+          </p:cNvPr>
+          <p:cNvSpPr>
+            <a:spLocks noGrp="1"/>
+          </p:cNvSpPr>
+          <p:nvPr>
+            <p:ph type="title"/>
+          </p:nvPr>
+        </p:nvSpPr>
+        <p:spPr/>
+        <p:txBody>
+          <a:bodyPr/>
+          <a:lstStyle/>
+          <a:p>
+            <a:r>
+              <a:rPr lang="en-US" dirty="0"/>
+              <a:t>Exposing a Port</a:t>
+            </a:r>
+          </a:p>
+        </p:txBody>
+      </p:sp>
+      <p:sp>
+        <p:nvSpPr>
+          <p:cNvPr id="3" name="Content Placeholder 2">
+            <a:extLst>
+              <a:ext uri="{FF2B5EF4-FFF2-40B4-BE49-F238E27FC236}">
+                <a16:creationId xmlns:a16="http://schemas.microsoft.com/office/drawing/2014/main" id="{25255FEF-5BB3-EC45-9476-C0318A77A789}"/>
+              </a:ext>
+            </a:extLst>
+          </p:cNvPr>
+          <p:cNvSpPr>
+            <a:spLocks noGrp="1"/>
+          </p:cNvSpPr>
+          <p:nvPr>
+            <p:ph idx="1"/>
+          </p:nvPr>
+        </p:nvSpPr>
+        <p:spPr/>
+        <p:txBody>
+          <a:bodyPr/>
+          <a:lstStyle/>
+          <a:p>
+            <a:r>
+              <a:rPr lang="en-US" dirty="0"/>
+              <a:t>Similar to files, network ports are not accessible by containers</a:t>
+            </a:r>
+          </a:p>
+          <a:p>
+            <a:r>
+              <a:rPr lang="en-US" dirty="0"/>
+              <a:t>We can expose them</a:t>
+            </a:r>
+          </a:p>
+          <a:p>
+            <a:r>
+              <a:rPr lang="en-US" dirty="0"/>
+              <a:t>Use -p </a:t>
+            </a:r>
+            <a:r>
+              <a:rPr lang="en-US" dirty="0" err="1"/>
+              <a:t>hostPort:containerPort</a:t>
+            </a:r>
+            <a:r>
+              <a:rPr lang="en-US" dirty="0"/>
+              <a:t> to map a port</a:t>
+            </a:r>
+          </a:p>
+          <a:p>
+            <a:pPr lvl="1"/>
+            <a:r>
+              <a:rPr lang="en-US" dirty="0"/>
+              <a:t>Ex. docker run –p 1234:80 python </a:t>
+            </a:r>
+          </a:p>
+        </p:txBody>
+      </p:sp>
+    </p:spTree>
+    <p:extLst>
+      <p:ext uri="{BB962C8B-B14F-4D97-AF65-F5344CB8AC3E}">
+        <p14:creationId xmlns:p14="http://schemas.microsoft.com/office/powerpoint/2010/main" val="2808310479"/>
+      </p:ext>
+    </p:extLst>
+  </p:cSld>
+  <p:clrMapOvr>
+    <a:masterClrMapping/>
+  </p:clrMapOvr>
+  <mc:AlternateContent xmlns:mc="http://schemas.openxmlformats.org/markup-compatibility/2006">
+    <mc:Choice xmlns:p14="http://schemas.microsoft.com/office/powerpoint/2010/main" Requires="p14">
+      <p:transition spd="med" p14:dur="700">
+        <p:fade/>
+      </p:transition>
+    </mc:Choice>
+    <mc:Fallback>
+      <p:transition spd="med">
+        <p:fade/>
+      </p:transition>
+    </mc:Fallback>
+  </mc:AlternateContent>
+</p:sld>
+</file>
+
+<file path=ppt/slides/slide19.xml><?xml version="1.0" encoding="utf-8"?>
+<p:sld xmlns:a="http://schemas.openxmlformats.org/drawingml/2006/main" xmlns:r="http://schemas.openxmlformats.org/officeDocument/2006/relationships" xmlns:p="http://schemas.openxmlformats.org/presentationml/2006/main">
+  <p:cSld>
+    <p:spTree>
+      <p:nvGrpSpPr>
+        <p:cNvPr id="1" name=""/>
+        <p:cNvGrpSpPr/>
+        <p:nvPr/>
+      </p:nvGrpSpPr>
+      <p:grpSpPr>
+        <a:xfrm>
+          <a:off x="0" y="0"/>
+          <a:ext cx="0" cy="0"/>
+          <a:chOff x="0" y="0"/>
+          <a:chExt cx="0" cy="0"/>
+        </a:xfrm>
+      </p:grpSpPr>
+      <p:sp>
+        <p:nvSpPr>
+          <p:cNvPr id="2" name="Title 1">
+            <a:extLst>
+              <a:ext uri="{FF2B5EF4-FFF2-40B4-BE49-F238E27FC236}">
+                <a16:creationId xmlns:a16="http://schemas.microsoft.com/office/drawing/2014/main" id="{B7A5DFD5-3A40-8B40-5A85-9D9A5660C9E5}"/>
+              </a:ext>
+            </a:extLst>
+          </p:cNvPr>
+          <p:cNvSpPr>
+            <a:spLocks noGrp="1"/>
+          </p:cNvSpPr>
+          <p:nvPr>
+            <p:ph type="title"/>
+          </p:nvPr>
+        </p:nvSpPr>
+        <p:spPr/>
+        <p:txBody>
+          <a:bodyPr/>
+          <a:lstStyle/>
+          <a:p>
+            <a:r>
+              <a:rPr lang="en-US" dirty="0"/>
+              <a:t>Writing a </a:t>
+            </a:r>
+            <a:r>
+              <a:rPr lang="en-US" dirty="0" err="1"/>
+              <a:t>Dockerfile</a:t>
+            </a:r>
+            <a:endParaRPr lang="en-US" dirty="0"/>
+          </a:p>
+        </p:txBody>
+      </p:sp>
+      <p:sp>
+        <p:nvSpPr>
+          <p:cNvPr id="3" name="Content Placeholder 2">
+            <a:extLst>
+              <a:ext uri="{FF2B5EF4-FFF2-40B4-BE49-F238E27FC236}">
+                <a16:creationId xmlns:a16="http://schemas.microsoft.com/office/drawing/2014/main" id="{25255FEF-5BB3-EC45-9476-C0318A77A789}"/>
+              </a:ext>
+            </a:extLst>
+          </p:cNvPr>
+          <p:cNvSpPr>
+            <a:spLocks noGrp="1"/>
+          </p:cNvSpPr>
+          <p:nvPr>
+            <p:ph idx="1"/>
+          </p:nvPr>
+        </p:nvSpPr>
+        <p:spPr/>
+        <p:txBody>
+          <a:bodyPr/>
+          <a:lstStyle/>
+          <a:p>
+            <a:r>
+              <a:rPr lang="en-US" dirty="0"/>
+              <a:t>A </a:t>
+            </a:r>
+            <a:r>
+              <a:rPr lang="en-US" dirty="0" err="1"/>
+              <a:t>Dockerfile</a:t>
+            </a:r>
+            <a:r>
+              <a:rPr lang="en-US" dirty="0"/>
+              <a:t> is a way to specify how to build an image</a:t>
+            </a:r>
+          </a:p>
+          <a:p>
+            <a:r>
+              <a:rPr lang="en-US" dirty="0"/>
+              <a:t>General format</a:t>
+            </a:r>
+          </a:p>
+          <a:p>
+            <a:pPr lvl="1"/>
+            <a:r>
+              <a:rPr lang="en-US" dirty="0"/>
+              <a:t>1. What image to use as a starting point</a:t>
+            </a:r>
+          </a:p>
+          <a:p>
+            <a:pPr lvl="1"/>
+            <a:r>
+              <a:rPr lang="en-US" dirty="0"/>
+              <a:t>2. Commands to copy files, run commands, etc.</a:t>
+            </a:r>
+          </a:p>
+          <a:p>
+            <a:pPr lvl="1"/>
+            <a:r>
+              <a:rPr lang="en-US" dirty="0"/>
+              <a:t>3. The default command to execute when launching a container</a:t>
+            </a:r>
+          </a:p>
+        </p:txBody>
+      </p:sp>
+    </p:spTree>
+    <p:extLst>
+      <p:ext uri="{BB962C8B-B14F-4D97-AF65-F5344CB8AC3E}">
+        <p14:creationId xmlns:p14="http://schemas.microsoft.com/office/powerpoint/2010/main" val="3790344289"/>
+      </p:ext>
+    </p:extLst>
+  </p:cSld>
+  <p:clrMapOvr>
+    <a:masterClrMapping/>
+  </p:clrMapOvr>
+  <mc:AlternateContent xmlns:mc="http://schemas.openxmlformats.org/markup-compatibility/2006">
+    <mc:Choice xmlns:p14="http://schemas.microsoft.com/office/powerpoint/2010/main" Requires="p14">
+      <p:transition spd="med" p14:dur="700">
+        <p:fade/>
+      </p:transition>
+    </mc:Choice>
+    <mc:Fallback>
       <p:transition spd="med">
         <p:fade/>
       </p:transition>
@@ -6670,6 +8396,817 @@
     <p:extLst>
       <p:ext uri="{BB962C8B-B14F-4D97-AF65-F5344CB8AC3E}">
         <p14:creationId xmlns:p14="http://schemas.microsoft.com/office/powerpoint/2010/main" val="3496665937"/>
+      </p:ext>
+    </p:extLst>
+  </p:cSld>
+  <p:clrMapOvr>
+    <a:masterClrMapping/>
+  </p:clrMapOvr>
+  <mc:AlternateContent xmlns:mc="http://schemas.openxmlformats.org/markup-compatibility/2006" xmlns:p14="http://schemas.microsoft.com/office/powerpoint/2010/main">
+    <mc:Choice Requires="p14">
+      <p:transition spd="med" p14:dur="700">
+        <p:fade/>
+      </p:transition>
+    </mc:Choice>
+    <mc:Fallback xmlns="">
+      <p:transition spd="med">
+        <p:fade/>
+      </p:transition>
+    </mc:Fallback>
+  </mc:AlternateContent>
+</p:sld>
+</file>
+
+<file path=ppt/slides/slide20.xml><?xml version="1.0" encoding="utf-8"?>
+<p:sld xmlns:a="http://schemas.openxmlformats.org/drawingml/2006/main" xmlns:r="http://schemas.openxmlformats.org/officeDocument/2006/relationships" xmlns:p="http://schemas.openxmlformats.org/presentationml/2006/main">
+  <p:cSld>
+    <p:spTree>
+      <p:nvGrpSpPr>
+        <p:cNvPr id="1" name=""/>
+        <p:cNvGrpSpPr/>
+        <p:nvPr/>
+      </p:nvGrpSpPr>
+      <p:grpSpPr>
+        <a:xfrm>
+          <a:off x="0" y="0"/>
+          <a:ext cx="0" cy="0"/>
+          <a:chOff x="0" y="0"/>
+          <a:chExt cx="0" cy="0"/>
+        </a:xfrm>
+      </p:grpSpPr>
+      <p:sp>
+        <p:nvSpPr>
+          <p:cNvPr id="2" name="Title 1">
+            <a:extLst>
+              <a:ext uri="{FF2B5EF4-FFF2-40B4-BE49-F238E27FC236}">
+                <a16:creationId xmlns:a16="http://schemas.microsoft.com/office/drawing/2014/main" id="{B7A5DFD5-3A40-8B40-5A85-9D9A5660C9E5}"/>
+              </a:ext>
+            </a:extLst>
+          </p:cNvPr>
+          <p:cNvSpPr>
+            <a:spLocks noGrp="1"/>
+          </p:cNvSpPr>
+          <p:nvPr>
+            <p:ph type="title"/>
+          </p:nvPr>
+        </p:nvSpPr>
+        <p:spPr/>
+        <p:txBody>
+          <a:bodyPr/>
+          <a:lstStyle/>
+          <a:p>
+            <a:r>
+              <a:rPr lang="en-US" dirty="0"/>
+              <a:t>Writing a </a:t>
+            </a:r>
+            <a:r>
+              <a:rPr lang="en-US" dirty="0" err="1"/>
+              <a:t>Dockerfile</a:t>
+            </a:r>
+            <a:endParaRPr lang="en-US" dirty="0"/>
+          </a:p>
+        </p:txBody>
+      </p:sp>
+      <p:sp>
+        <p:nvSpPr>
+          <p:cNvPr id="3" name="Content Placeholder 2">
+            <a:extLst>
+              <a:ext uri="{FF2B5EF4-FFF2-40B4-BE49-F238E27FC236}">
+                <a16:creationId xmlns:a16="http://schemas.microsoft.com/office/drawing/2014/main" id="{25255FEF-5BB3-EC45-9476-C0318A77A789}"/>
+              </a:ext>
+            </a:extLst>
+          </p:cNvPr>
+          <p:cNvSpPr>
+            <a:spLocks noGrp="1"/>
+          </p:cNvSpPr>
+          <p:nvPr>
+            <p:ph idx="1"/>
+          </p:nvPr>
+        </p:nvSpPr>
+        <p:spPr>
+          <a:xfrm>
+            <a:off x="818712" y="2642420"/>
+            <a:ext cx="10554574" cy="3636511"/>
+          </a:xfrm>
+        </p:spPr>
+        <p:txBody>
+          <a:bodyPr/>
+          <a:lstStyle/>
+          <a:p>
+            <a:pPr marL="0" indent="0">
+              <a:buNone/>
+            </a:pPr>
+            <a:r>
+              <a:rPr lang="en-US" dirty="0"/>
+              <a:t>We will look at 8 instructions</a:t>
+            </a:r>
+          </a:p>
+          <a:p>
+            <a:r>
+              <a:rPr lang="en-US" dirty="0"/>
+              <a:t>FROM</a:t>
+            </a:r>
+          </a:p>
+          <a:p>
+            <a:r>
+              <a:rPr lang="en-US" dirty="0"/>
+              <a:t>COPY/ADD</a:t>
+            </a:r>
+          </a:p>
+          <a:p>
+            <a:r>
+              <a:rPr lang="en-US" dirty="0"/>
+              <a:t>RUN</a:t>
+            </a:r>
+          </a:p>
+          <a:p>
+            <a:pPr marL="0" indent="0">
+              <a:buNone/>
+            </a:pPr>
+            <a:r>
+              <a:rPr lang="en-US" dirty="0"/>
+              <a:t>We can run docker build to make the image. Ex. docker build –t </a:t>
+            </a:r>
+            <a:r>
+              <a:rPr lang="en-US" dirty="0" err="1"/>
+              <a:t>name:tag</a:t>
+            </a:r>
+            <a:endParaRPr lang="en-US" dirty="0"/>
+          </a:p>
+          <a:p>
+            <a:pPr marL="0" indent="0">
+              <a:buNone/>
+            </a:pPr>
+            <a:endParaRPr lang="en-US" dirty="0"/>
+          </a:p>
+        </p:txBody>
+      </p:sp>
+      <p:sp>
+        <p:nvSpPr>
+          <p:cNvPr id="4" name="Content Placeholder 2">
+            <a:extLst>
+              <a:ext uri="{FF2B5EF4-FFF2-40B4-BE49-F238E27FC236}">
+                <a16:creationId xmlns:a16="http://schemas.microsoft.com/office/drawing/2014/main" id="{D262EADD-AA73-D177-BFD3-C21C92140BE2}"/>
+              </a:ext>
+            </a:extLst>
+          </p:cNvPr>
+          <p:cNvSpPr txBox="1">
+            <a:spLocks/>
+          </p:cNvSpPr>
+          <p:nvPr/>
+        </p:nvSpPr>
+        <p:spPr>
+          <a:xfrm>
+            <a:off x="2701060" y="2214048"/>
+            <a:ext cx="10554574" cy="3636511"/>
+          </a:xfrm>
+          <a:prstGeom prst="rect">
+            <a:avLst/>
+          </a:prstGeom>
+          <a:effectLst>
+            <a:outerShdw blurRad="50800" dir="14400000">
+              <a:srgbClr val="000000">
+                <a:alpha val="40000"/>
+              </a:srgbClr>
+            </a:outerShdw>
+          </a:effectLst>
+        </p:spPr>
+        <p:txBody>
+          <a:bodyPr vert="horz" lIns="91440" tIns="45720" rIns="91440" bIns="45720" rtlCol="0" anchor="ctr">
+            <a:normAutofit/>
+          </a:bodyPr>
+          <a:lstStyle>
+            <a:lvl1pPr marL="342900" indent="-342900" algn="l" defTabSz="457200" rtl="0" eaLnBrk="1" latinLnBrk="0" hangingPunct="1">
+              <a:spcBef>
+                <a:spcPct val="20000"/>
+              </a:spcBef>
+              <a:spcAft>
+                <a:spcPts val="600"/>
+              </a:spcAft>
+              <a:buClr>
+                <a:schemeClr val="accent1"/>
+              </a:buClr>
+              <a:buFont typeface="Wingdings 2" charset="2"/>
+              <a:buChar char=""/>
+              <a:defRPr sz="1800" kern="1200">
+                <a:solidFill>
+                  <a:schemeClr val="tx1"/>
+                </a:solidFill>
+                <a:latin typeface="+mn-lt"/>
+                <a:ea typeface="+mn-ea"/>
+                <a:cs typeface="+mn-cs"/>
+              </a:defRPr>
+            </a:lvl1pPr>
+            <a:lvl2pPr marL="742950" indent="-285750" algn="l" defTabSz="457200" rtl="0" eaLnBrk="1" latinLnBrk="0" hangingPunct="1">
+              <a:spcBef>
+                <a:spcPct val="20000"/>
+              </a:spcBef>
+              <a:spcAft>
+                <a:spcPts val="600"/>
+              </a:spcAft>
+              <a:buClr>
+                <a:schemeClr val="accent1"/>
+              </a:buClr>
+              <a:buFont typeface="Wingdings 2" charset="2"/>
+              <a:buChar char=""/>
+              <a:defRPr sz="1600" kern="1200">
+                <a:solidFill>
+                  <a:schemeClr val="tx1"/>
+                </a:solidFill>
+                <a:latin typeface="+mn-lt"/>
+                <a:ea typeface="+mn-ea"/>
+                <a:cs typeface="+mn-cs"/>
+              </a:defRPr>
+            </a:lvl2pPr>
+            <a:lvl3pPr marL="1143000" indent="-228600" algn="l" defTabSz="457200" rtl="0" eaLnBrk="1" latinLnBrk="0" hangingPunct="1">
+              <a:spcBef>
+                <a:spcPct val="20000"/>
+              </a:spcBef>
+              <a:spcAft>
+                <a:spcPts val="600"/>
+              </a:spcAft>
+              <a:buClr>
+                <a:schemeClr val="accent1"/>
+              </a:buClr>
+              <a:buFont typeface="Wingdings 2" charset="2"/>
+              <a:buChar char=""/>
+              <a:defRPr sz="1400" kern="1200">
+                <a:solidFill>
+                  <a:schemeClr val="tx1"/>
+                </a:solidFill>
+                <a:latin typeface="+mn-lt"/>
+                <a:ea typeface="+mn-ea"/>
+                <a:cs typeface="+mn-cs"/>
+              </a:defRPr>
+            </a:lvl3pPr>
+            <a:lvl4pPr marL="1600200" indent="-228600" algn="l" defTabSz="457200" rtl="0" eaLnBrk="1" latinLnBrk="0" hangingPunct="1">
+              <a:spcBef>
+                <a:spcPct val="20000"/>
+              </a:spcBef>
+              <a:spcAft>
+                <a:spcPts val="600"/>
+              </a:spcAft>
+              <a:buClr>
+                <a:schemeClr val="accent1"/>
+              </a:buClr>
+              <a:buFont typeface="Wingdings 2" charset="2"/>
+              <a:buChar char=""/>
+              <a:defRPr sz="1200" kern="1200">
+                <a:solidFill>
+                  <a:schemeClr val="tx1"/>
+                </a:solidFill>
+                <a:latin typeface="+mn-lt"/>
+                <a:ea typeface="+mn-ea"/>
+                <a:cs typeface="+mn-cs"/>
+              </a:defRPr>
+            </a:lvl4pPr>
+            <a:lvl5pPr marL="2057400" indent="-228600" algn="l" defTabSz="457200" rtl="0" eaLnBrk="1" latinLnBrk="0" hangingPunct="1">
+              <a:spcBef>
+                <a:spcPct val="20000"/>
+              </a:spcBef>
+              <a:spcAft>
+                <a:spcPts val="600"/>
+              </a:spcAft>
+              <a:buClr>
+                <a:schemeClr val="accent1"/>
+              </a:buClr>
+              <a:buFont typeface="Wingdings 2" charset="2"/>
+              <a:buChar char=""/>
+              <a:defRPr sz="1200" kern="1200">
+                <a:solidFill>
+                  <a:schemeClr val="tx1"/>
+                </a:solidFill>
+                <a:latin typeface="+mn-lt"/>
+                <a:ea typeface="+mn-ea"/>
+                <a:cs typeface="+mn-cs"/>
+              </a:defRPr>
+            </a:lvl5pPr>
+            <a:lvl6pPr marL="2400000" indent="-228600" algn="l" defTabSz="457200" rtl="0" eaLnBrk="1" latinLnBrk="0" hangingPunct="1">
+              <a:spcBef>
+                <a:spcPct val="20000"/>
+              </a:spcBef>
+              <a:spcAft>
+                <a:spcPts val="600"/>
+              </a:spcAft>
+              <a:buClr>
+                <a:schemeClr val="accent1"/>
+              </a:buClr>
+              <a:buFont typeface="Wingdings 2" charset="2"/>
+              <a:buChar char=""/>
+              <a:defRPr sz="1200" kern="1200">
+                <a:solidFill>
+                  <a:schemeClr val="tx1"/>
+                </a:solidFill>
+                <a:latin typeface="+mn-lt"/>
+                <a:ea typeface="+mn-ea"/>
+                <a:cs typeface="+mn-cs"/>
+              </a:defRPr>
+            </a:lvl6pPr>
+            <a:lvl7pPr marL="2800000" indent="-228600" algn="l" defTabSz="457200" rtl="0" eaLnBrk="1" latinLnBrk="0" hangingPunct="1">
+              <a:spcBef>
+                <a:spcPct val="20000"/>
+              </a:spcBef>
+              <a:spcAft>
+                <a:spcPts val="600"/>
+              </a:spcAft>
+              <a:buClr>
+                <a:schemeClr val="accent1"/>
+              </a:buClr>
+              <a:buFont typeface="Wingdings 2" charset="2"/>
+              <a:buChar char=""/>
+              <a:defRPr sz="1200" kern="1200">
+                <a:solidFill>
+                  <a:schemeClr val="tx1"/>
+                </a:solidFill>
+                <a:latin typeface="+mn-lt"/>
+                <a:ea typeface="+mn-ea"/>
+                <a:cs typeface="+mn-cs"/>
+              </a:defRPr>
+            </a:lvl7pPr>
+            <a:lvl8pPr marL="3200000" indent="-228600" algn="l" defTabSz="457200" rtl="0" eaLnBrk="1" latinLnBrk="0" hangingPunct="1">
+              <a:spcBef>
+                <a:spcPct val="20000"/>
+              </a:spcBef>
+              <a:spcAft>
+                <a:spcPts val="600"/>
+              </a:spcAft>
+              <a:buClr>
+                <a:schemeClr val="accent1"/>
+              </a:buClr>
+              <a:buFont typeface="Wingdings 2" charset="2"/>
+              <a:buChar char=""/>
+              <a:defRPr sz="1200" kern="1200">
+                <a:solidFill>
+                  <a:schemeClr val="tx1"/>
+                </a:solidFill>
+                <a:latin typeface="+mn-lt"/>
+                <a:ea typeface="+mn-ea"/>
+                <a:cs typeface="+mn-cs"/>
+              </a:defRPr>
+            </a:lvl8pPr>
+            <a:lvl9pPr marL="3600000" indent="-228600" algn="l" defTabSz="457200" rtl="0" eaLnBrk="1" latinLnBrk="0" hangingPunct="1">
+              <a:spcBef>
+                <a:spcPct val="20000"/>
+              </a:spcBef>
+              <a:spcAft>
+                <a:spcPts val="600"/>
+              </a:spcAft>
+              <a:buClr>
+                <a:schemeClr val="accent1"/>
+              </a:buClr>
+              <a:buFont typeface="Wingdings 2" charset="2"/>
+              <a:buChar char=""/>
+              <a:defRPr sz="1200" kern="1200">
+                <a:solidFill>
+                  <a:schemeClr val="tx1"/>
+                </a:solidFill>
+                <a:latin typeface="+mn-lt"/>
+                <a:ea typeface="+mn-ea"/>
+                <a:cs typeface="+mn-cs"/>
+              </a:defRPr>
+            </a:lvl9pPr>
+          </a:lstStyle>
+          <a:p>
+            <a:pPr marL="0" indent="0">
+              <a:buFont typeface="Wingdings 2" charset="2"/>
+              <a:buNone/>
+            </a:pPr>
+            <a:endParaRPr lang="en-US" dirty="0"/>
+          </a:p>
+          <a:p>
+            <a:r>
+              <a:rPr lang="en-US" dirty="0"/>
+              <a:t>ENV</a:t>
+            </a:r>
+          </a:p>
+          <a:p>
+            <a:r>
+              <a:rPr lang="en-US" dirty="0"/>
+              <a:t>WORKDIR</a:t>
+            </a:r>
+          </a:p>
+          <a:p>
+            <a:r>
+              <a:rPr lang="en-US" dirty="0"/>
+              <a:t>CMD/ENTRYPOINT</a:t>
+            </a:r>
+          </a:p>
+        </p:txBody>
+      </p:sp>
+    </p:spTree>
+    <p:extLst>
+      <p:ext uri="{BB962C8B-B14F-4D97-AF65-F5344CB8AC3E}">
+        <p14:creationId xmlns:p14="http://schemas.microsoft.com/office/powerpoint/2010/main" val="3596814870"/>
+      </p:ext>
+    </p:extLst>
+  </p:cSld>
+  <p:clrMapOvr>
+    <a:masterClrMapping/>
+  </p:clrMapOvr>
+  <mc:AlternateContent xmlns:mc="http://schemas.openxmlformats.org/markup-compatibility/2006">
+    <mc:Choice xmlns:p14="http://schemas.microsoft.com/office/powerpoint/2010/main" Requires="p14">
+      <p:transition spd="med" p14:dur="700">
+        <p:fade/>
+      </p:transition>
+    </mc:Choice>
+    <mc:Fallback>
+      <p:transition spd="med">
+        <p:fade/>
+      </p:transition>
+    </mc:Fallback>
+  </mc:AlternateContent>
+</p:sld>
+</file>
+
+<file path=ppt/slides/slide21.xml><?xml version="1.0" encoding="utf-8"?>
+<p:sld xmlns:a="http://schemas.openxmlformats.org/drawingml/2006/main" xmlns:r="http://schemas.openxmlformats.org/officeDocument/2006/relationships" xmlns:p="http://schemas.openxmlformats.org/presentationml/2006/main">
+  <p:cSld>
+    <p:spTree>
+      <p:nvGrpSpPr>
+        <p:cNvPr id="1" name=""/>
+        <p:cNvGrpSpPr/>
+        <p:nvPr/>
+      </p:nvGrpSpPr>
+      <p:grpSpPr>
+        <a:xfrm>
+          <a:off x="0" y="0"/>
+          <a:ext cx="0" cy="0"/>
+          <a:chOff x="0" y="0"/>
+          <a:chExt cx="0" cy="0"/>
+        </a:xfrm>
+      </p:grpSpPr>
+      <p:sp>
+        <p:nvSpPr>
+          <p:cNvPr id="2" name="Title 1">
+            <a:extLst>
+              <a:ext uri="{FF2B5EF4-FFF2-40B4-BE49-F238E27FC236}">
+                <a16:creationId xmlns:a16="http://schemas.microsoft.com/office/drawing/2014/main" id="{B7A5DFD5-3A40-8B40-5A85-9D9A5660C9E5}"/>
+              </a:ext>
+            </a:extLst>
+          </p:cNvPr>
+          <p:cNvSpPr>
+            <a:spLocks noGrp="1"/>
+          </p:cNvSpPr>
+          <p:nvPr>
+            <p:ph type="title"/>
+          </p:nvPr>
+        </p:nvSpPr>
+        <p:spPr/>
+        <p:txBody>
+          <a:bodyPr/>
+          <a:lstStyle/>
+          <a:p>
+            <a:r>
+              <a:rPr lang="en-US" dirty="0"/>
+              <a:t>Next Steps</a:t>
+            </a:r>
+          </a:p>
+        </p:txBody>
+      </p:sp>
+      <p:sp>
+        <p:nvSpPr>
+          <p:cNvPr id="3" name="Content Placeholder 2">
+            <a:extLst>
+              <a:ext uri="{FF2B5EF4-FFF2-40B4-BE49-F238E27FC236}">
+                <a16:creationId xmlns:a16="http://schemas.microsoft.com/office/drawing/2014/main" id="{25255FEF-5BB3-EC45-9476-C0318A77A789}"/>
+              </a:ext>
+            </a:extLst>
+          </p:cNvPr>
+          <p:cNvSpPr>
+            <a:spLocks noGrp="1"/>
+          </p:cNvSpPr>
+          <p:nvPr>
+            <p:ph idx="1"/>
+          </p:nvPr>
+        </p:nvSpPr>
+        <p:spPr/>
+        <p:txBody>
+          <a:bodyPr/>
+          <a:lstStyle/>
+          <a:p>
+            <a:r>
+              <a:rPr lang="en-US" dirty="0"/>
+              <a:t>Other Docker features</a:t>
+            </a:r>
+          </a:p>
+          <a:p>
+            <a:r>
+              <a:rPr lang="en-US" dirty="0"/>
+              <a:t>Docker Compose</a:t>
+            </a:r>
+          </a:p>
+          <a:p>
+            <a:r>
+              <a:rPr lang="en-US" dirty="0"/>
+              <a:t>Kubernetes</a:t>
+            </a:r>
+          </a:p>
+        </p:txBody>
+      </p:sp>
+    </p:spTree>
+    <p:extLst>
+      <p:ext uri="{BB962C8B-B14F-4D97-AF65-F5344CB8AC3E}">
+        <p14:creationId xmlns:p14="http://schemas.microsoft.com/office/powerpoint/2010/main" val="326915790"/>
+      </p:ext>
+    </p:extLst>
+  </p:cSld>
+  <p:clrMapOvr>
+    <a:masterClrMapping/>
+  </p:clrMapOvr>
+  <mc:AlternateContent xmlns:mc="http://schemas.openxmlformats.org/markup-compatibility/2006">
+    <mc:Choice xmlns:p14="http://schemas.microsoft.com/office/powerpoint/2010/main" Requires="p14">
+      <p:transition spd="med" p14:dur="700">
+        <p:fade/>
+      </p:transition>
+    </mc:Choice>
+    <mc:Fallback>
+      <p:transition spd="med">
+        <p:fade/>
+      </p:transition>
+    </mc:Fallback>
+  </mc:AlternateContent>
+</p:sld>
+</file>
+
+<file path=ppt/slides/slide22.xml><?xml version="1.0" encoding="utf-8"?>
+<p:sld xmlns:a="http://schemas.openxmlformats.org/drawingml/2006/main" xmlns:r="http://schemas.openxmlformats.org/officeDocument/2006/relationships" xmlns:p="http://schemas.openxmlformats.org/presentationml/2006/main">
+  <p:cSld>
+    <p:spTree>
+      <p:nvGrpSpPr>
+        <p:cNvPr id="1" name=""/>
+        <p:cNvGrpSpPr/>
+        <p:nvPr/>
+      </p:nvGrpSpPr>
+      <p:grpSpPr>
+        <a:xfrm>
+          <a:off x="0" y="0"/>
+          <a:ext cx="0" cy="0"/>
+          <a:chOff x="0" y="0"/>
+          <a:chExt cx="0" cy="0"/>
+        </a:xfrm>
+      </p:grpSpPr>
+      <p:sp>
+        <p:nvSpPr>
+          <p:cNvPr id="2" name="Title 1">
+            <a:extLst>
+              <a:ext uri="{FF2B5EF4-FFF2-40B4-BE49-F238E27FC236}">
+                <a16:creationId xmlns:a16="http://schemas.microsoft.com/office/drawing/2014/main" id="{8E6263C1-CA40-5BC9-92AA-7D371D38B9AF}"/>
+              </a:ext>
+            </a:extLst>
+          </p:cNvPr>
+          <p:cNvSpPr>
+            <a:spLocks noGrp="1"/>
+          </p:cNvSpPr>
+          <p:nvPr>
+            <p:ph type="title"/>
+          </p:nvPr>
+        </p:nvSpPr>
+        <p:spPr/>
+        <p:txBody>
+          <a:bodyPr/>
+          <a:lstStyle/>
+          <a:p>
+            <a:r>
+              <a:rPr lang="en-US" dirty="0"/>
+              <a:t>A Few Takeaways</a:t>
+            </a:r>
+          </a:p>
+        </p:txBody>
+      </p:sp>
+      <p:sp>
+        <p:nvSpPr>
+          <p:cNvPr id="3" name="Text Placeholder 2">
+            <a:extLst>
+              <a:ext uri="{FF2B5EF4-FFF2-40B4-BE49-F238E27FC236}">
+                <a16:creationId xmlns:a16="http://schemas.microsoft.com/office/drawing/2014/main" id="{DBD593F8-5240-91FB-2F56-6D03F20498F4}"/>
+              </a:ext>
+            </a:extLst>
+          </p:cNvPr>
+          <p:cNvSpPr>
+            <a:spLocks noGrp="1"/>
+          </p:cNvSpPr>
+          <p:nvPr>
+            <p:ph type="body" idx="1"/>
+          </p:nvPr>
+        </p:nvSpPr>
+        <p:spPr/>
+        <p:txBody>
+          <a:bodyPr/>
+          <a:lstStyle/>
+          <a:p>
+            <a:endParaRPr lang="en-US"/>
+          </a:p>
+        </p:txBody>
+      </p:sp>
+    </p:spTree>
+    <p:extLst>
+      <p:ext uri="{BB962C8B-B14F-4D97-AF65-F5344CB8AC3E}">
+        <p14:creationId xmlns:p14="http://schemas.microsoft.com/office/powerpoint/2010/main" val="2858677990"/>
+      </p:ext>
+    </p:extLst>
+  </p:cSld>
+  <p:clrMapOvr>
+    <a:masterClrMapping/>
+  </p:clrMapOvr>
+  <mc:AlternateContent xmlns:mc="http://schemas.openxmlformats.org/markup-compatibility/2006" xmlns:p14="http://schemas.microsoft.com/office/powerpoint/2010/main">
+    <mc:Choice Requires="p14">
+      <p:transition spd="med" p14:dur="700">
+        <p:fade/>
+      </p:transition>
+    </mc:Choice>
+    <mc:Fallback xmlns="">
+      <p:transition spd="med">
+        <p:fade/>
+      </p:transition>
+    </mc:Fallback>
+  </mc:AlternateContent>
+</p:sld>
+</file>
+
+<file path=ppt/slides/slide23.xml><?xml version="1.0" encoding="utf-8"?>
+<p:sld xmlns:a="http://schemas.openxmlformats.org/drawingml/2006/main" xmlns:r="http://schemas.openxmlformats.org/officeDocument/2006/relationships" xmlns:p="http://schemas.openxmlformats.org/presentationml/2006/main">
+  <p:cSld>
+    <p:spTree>
+      <p:nvGrpSpPr>
+        <p:cNvPr id="1" name=""/>
+        <p:cNvGrpSpPr/>
+        <p:nvPr/>
+      </p:nvGrpSpPr>
+      <p:grpSpPr>
+        <a:xfrm>
+          <a:off x="0" y="0"/>
+          <a:ext cx="0" cy="0"/>
+          <a:chOff x="0" y="0"/>
+          <a:chExt cx="0" cy="0"/>
+        </a:xfrm>
+      </p:grpSpPr>
+      <p:sp>
+        <p:nvSpPr>
+          <p:cNvPr id="2" name="Title 1">
+            <a:extLst>
+              <a:ext uri="{FF2B5EF4-FFF2-40B4-BE49-F238E27FC236}">
+                <a16:creationId xmlns:a16="http://schemas.microsoft.com/office/drawing/2014/main" id="{DD13BAF0-C6D0-6C35-7E1E-54E8C803D102}"/>
+              </a:ext>
+            </a:extLst>
+          </p:cNvPr>
+          <p:cNvSpPr>
+            <a:spLocks noGrp="1"/>
+          </p:cNvSpPr>
+          <p:nvPr>
+            <p:ph type="title"/>
+          </p:nvPr>
+        </p:nvSpPr>
+        <p:spPr/>
+        <p:txBody>
+          <a:bodyPr/>
+          <a:lstStyle/>
+          <a:p>
+            <a:r>
+              <a:rPr lang="en-US" dirty="0"/>
+              <a:t>A Few Takeaways</a:t>
+            </a:r>
+          </a:p>
+        </p:txBody>
+      </p:sp>
+      <p:sp>
+        <p:nvSpPr>
+          <p:cNvPr id="3" name="Content Placeholder 2">
+            <a:extLst>
+              <a:ext uri="{FF2B5EF4-FFF2-40B4-BE49-F238E27FC236}">
+                <a16:creationId xmlns:a16="http://schemas.microsoft.com/office/drawing/2014/main" id="{F948990A-5766-F5D5-B6C4-E83EC504FDAF}"/>
+              </a:ext>
+            </a:extLst>
+          </p:cNvPr>
+          <p:cNvSpPr>
+            <a:spLocks noGrp="1"/>
+          </p:cNvSpPr>
+          <p:nvPr>
+            <p:ph idx="1"/>
+          </p:nvPr>
+        </p:nvSpPr>
+        <p:spPr/>
+        <p:txBody>
+          <a:bodyPr/>
+          <a:lstStyle/>
+          <a:p>
+            <a:r>
+              <a:rPr lang="en-US" dirty="0"/>
+              <a:t>Practice will help you remember, but…</a:t>
+            </a:r>
+          </a:p>
+          <a:p>
+            <a:r>
+              <a:rPr lang="en-US" dirty="0"/>
+              <a:t>It’s okay if you don’t remember everything!</a:t>
+            </a:r>
+          </a:p>
+          <a:p>
+            <a:r>
+              <a:rPr lang="en-US" dirty="0"/>
+              <a:t>Strive to learn new things and be patient</a:t>
+            </a:r>
+          </a:p>
+        </p:txBody>
+      </p:sp>
+    </p:spTree>
+    <p:extLst>
+      <p:ext uri="{BB962C8B-B14F-4D97-AF65-F5344CB8AC3E}">
+        <p14:creationId xmlns:p14="http://schemas.microsoft.com/office/powerpoint/2010/main" val="1870428455"/>
+      </p:ext>
+    </p:extLst>
+  </p:cSld>
+  <p:clrMapOvr>
+    <a:masterClrMapping/>
+  </p:clrMapOvr>
+  <mc:AlternateContent xmlns:mc="http://schemas.openxmlformats.org/markup-compatibility/2006" xmlns:p14="http://schemas.microsoft.com/office/powerpoint/2010/main">
+    <mc:Choice Requires="p14">
+      <p:transition spd="med" p14:dur="700">
+        <p:fade/>
+      </p:transition>
+    </mc:Choice>
+    <mc:Fallback xmlns="">
+      <p:transition spd="med">
+        <p:fade/>
+      </p:transition>
+    </mc:Fallback>
+  </mc:AlternateContent>
+</p:sld>
+</file>
+
+<file path=ppt/slides/slide24.xml><?xml version="1.0" encoding="utf-8"?>
+<p:sld xmlns:a="http://schemas.openxmlformats.org/drawingml/2006/main" xmlns:r="http://schemas.openxmlformats.org/officeDocument/2006/relationships" xmlns:p="http://schemas.openxmlformats.org/presentationml/2006/main">
+  <p:cSld>
+    <p:spTree>
+      <p:nvGrpSpPr>
+        <p:cNvPr id="1" name=""/>
+        <p:cNvGrpSpPr/>
+        <p:nvPr/>
+      </p:nvGrpSpPr>
+      <p:grpSpPr>
+        <a:xfrm>
+          <a:off x="0" y="0"/>
+          <a:ext cx="0" cy="0"/>
+          <a:chOff x="0" y="0"/>
+          <a:chExt cx="0" cy="0"/>
+        </a:xfrm>
+      </p:grpSpPr>
+      <p:sp>
+        <p:nvSpPr>
+          <p:cNvPr id="2" name="Title 1">
+            <a:extLst>
+              <a:ext uri="{FF2B5EF4-FFF2-40B4-BE49-F238E27FC236}">
+                <a16:creationId xmlns:a16="http://schemas.microsoft.com/office/drawing/2014/main" id="{DFAE9FAE-F47D-0E93-67EB-E210274D0472}"/>
+              </a:ext>
+            </a:extLst>
+          </p:cNvPr>
+          <p:cNvSpPr>
+            <a:spLocks noGrp="1"/>
+          </p:cNvSpPr>
+          <p:nvPr>
+            <p:ph type="title"/>
+          </p:nvPr>
+        </p:nvSpPr>
+        <p:spPr/>
+        <p:txBody>
+          <a:bodyPr/>
+          <a:lstStyle/>
+          <a:p>
+            <a:r>
+              <a:rPr lang="en-US" dirty="0"/>
+              <a:t>Thank you for attending!</a:t>
+            </a:r>
+          </a:p>
+        </p:txBody>
+      </p:sp>
+      <p:sp>
+        <p:nvSpPr>
+          <p:cNvPr id="3" name="Text Placeholder 2">
+            <a:extLst>
+              <a:ext uri="{FF2B5EF4-FFF2-40B4-BE49-F238E27FC236}">
+                <a16:creationId xmlns:a16="http://schemas.microsoft.com/office/drawing/2014/main" id="{8B91F699-C506-8E7A-4B6D-B0CC5DD14AE1}"/>
+              </a:ext>
+            </a:extLst>
+          </p:cNvPr>
+          <p:cNvSpPr>
+            <a:spLocks noGrp="1"/>
+          </p:cNvSpPr>
+          <p:nvPr>
+            <p:ph type="body" idx="1"/>
+          </p:nvPr>
+        </p:nvSpPr>
+        <p:spPr/>
+        <p:txBody>
+          <a:bodyPr/>
+          <a:lstStyle/>
+          <a:p>
+            <a:endParaRPr lang="en-US"/>
+          </a:p>
+        </p:txBody>
+      </p:sp>
+    </p:spTree>
+    <p:extLst>
+      <p:ext uri="{BB962C8B-B14F-4D97-AF65-F5344CB8AC3E}">
+        <p14:creationId xmlns:p14="http://schemas.microsoft.com/office/powerpoint/2010/main" val="2773150868"/>
       </p:ext>
     </p:extLst>
   </p:cSld>
@@ -12745,7 +15282,23 @@
           <a:bodyPr/>
           <a:lstStyle/>
           <a:p>
-            <a:endParaRPr lang="en-US"/>
+            <a:r>
+              <a:rPr lang="en-US" dirty="0"/>
+              <a:t>If you want to follow along, please install Docker from:</a:t>
+            </a:r>
+            <a:br>
+              <a:rPr lang="en-US" dirty="0"/>
+            </a:br>
+            <a:r>
+              <a:rPr lang="en-US" dirty="0">
+                <a:hlinkClick r:id="rId2"/>
+              </a:rPr>
+              <a:t>https://docs.docker.com/get-docker/</a:t>
+            </a:r>
+            <a:r>
+              <a:rPr lang="en-US" dirty="0"/>
+              <a:t> </a:t>
+            </a:r>
           </a:p>
         </p:txBody>
       </p:sp>

</xml_diff>